<commit_message>
rename *_vol to *
</commit_message>
<xml_diff>
--- a/doc/state-cmd.pptx
+++ b/doc/state-cmd.pptx
@@ -288,7 +288,7 @@
           <a:p>
             <a:fld id="{FC956616-CD33-46B8-9478-BE04F8ED56F2}" type="datetimeFigureOut">
               <a:rPr kumimoji="1" lang="ja-JP" altLang="en-US" smtClean="0"/>
-              <a:t>2014/9/17</a:t>
+              <a:t>2014/10/15</a:t>
             </a:fld>
             <a:endParaRPr kumimoji="1" lang="ja-JP" altLang="en-US"/>
           </a:p>
@@ -490,7 +490,7 @@
           <a:p>
             <a:fld id="{FC956616-CD33-46B8-9478-BE04F8ED56F2}" type="datetimeFigureOut">
               <a:rPr kumimoji="1" lang="ja-JP" altLang="en-US" smtClean="0"/>
-              <a:t>2014/9/17</a:t>
+              <a:t>2014/10/15</a:t>
             </a:fld>
             <a:endParaRPr kumimoji="1" lang="ja-JP" altLang="en-US"/>
           </a:p>
@@ -702,7 +702,7 @@
           <a:p>
             <a:fld id="{FC956616-CD33-46B8-9478-BE04F8ED56F2}" type="datetimeFigureOut">
               <a:rPr kumimoji="1" lang="ja-JP" altLang="en-US" smtClean="0"/>
-              <a:t>2014/9/17</a:t>
+              <a:t>2014/10/15</a:t>
             </a:fld>
             <a:endParaRPr kumimoji="1" lang="ja-JP" altLang="en-US"/>
           </a:p>
@@ -904,7 +904,7 @@
           <a:p>
             <a:fld id="{FC956616-CD33-46B8-9478-BE04F8ED56F2}" type="datetimeFigureOut">
               <a:rPr kumimoji="1" lang="ja-JP" altLang="en-US" smtClean="0"/>
-              <a:t>2014/9/17</a:t>
+              <a:t>2014/10/15</a:t>
             </a:fld>
             <a:endParaRPr kumimoji="1" lang="ja-JP" altLang="en-US"/>
           </a:p>
@@ -1150,7 +1150,7 @@
           <a:p>
             <a:fld id="{FC956616-CD33-46B8-9478-BE04F8ED56F2}" type="datetimeFigureOut">
               <a:rPr kumimoji="1" lang="ja-JP" altLang="en-US" smtClean="0"/>
-              <a:t>2014/9/17</a:t>
+              <a:t>2014/10/15</a:t>
             </a:fld>
             <a:endParaRPr kumimoji="1" lang="ja-JP" altLang="en-US"/>
           </a:p>
@@ -1502,7 +1502,7 @@
           <a:p>
             <a:fld id="{FC956616-CD33-46B8-9478-BE04F8ED56F2}" type="datetimeFigureOut">
               <a:rPr kumimoji="1" lang="ja-JP" altLang="en-US" smtClean="0"/>
-              <a:t>2014/9/17</a:t>
+              <a:t>2014/10/15</a:t>
             </a:fld>
             <a:endParaRPr kumimoji="1" lang="ja-JP" altLang="en-US"/>
           </a:p>
@@ -1988,7 +1988,7 @@
           <a:p>
             <a:fld id="{FC956616-CD33-46B8-9478-BE04F8ED56F2}" type="datetimeFigureOut">
               <a:rPr kumimoji="1" lang="ja-JP" altLang="en-US" smtClean="0"/>
-              <a:t>2014/9/17</a:t>
+              <a:t>2014/10/15</a:t>
             </a:fld>
             <a:endParaRPr kumimoji="1" lang="ja-JP" altLang="en-US"/>
           </a:p>
@@ -2106,7 +2106,7 @@
           <a:p>
             <a:fld id="{FC956616-CD33-46B8-9478-BE04F8ED56F2}" type="datetimeFigureOut">
               <a:rPr kumimoji="1" lang="ja-JP" altLang="en-US" smtClean="0"/>
-              <a:t>2014/9/17</a:t>
+              <a:t>2014/10/15</a:t>
             </a:fld>
             <a:endParaRPr kumimoji="1" lang="ja-JP" altLang="en-US"/>
           </a:p>
@@ -2201,7 +2201,7 @@
           <a:p>
             <a:fld id="{FC956616-CD33-46B8-9478-BE04F8ED56F2}" type="datetimeFigureOut">
               <a:rPr kumimoji="1" lang="ja-JP" altLang="en-US" smtClean="0"/>
-              <a:t>2014/9/17</a:t>
+              <a:t>2014/10/15</a:t>
             </a:fld>
             <a:endParaRPr kumimoji="1" lang="ja-JP" altLang="en-US"/>
           </a:p>
@@ -2510,7 +2510,7 @@
           <a:p>
             <a:fld id="{FC956616-CD33-46B8-9478-BE04F8ED56F2}" type="datetimeFigureOut">
               <a:rPr kumimoji="1" lang="ja-JP" altLang="en-US" smtClean="0"/>
-              <a:t>2014/9/17</a:t>
+              <a:t>2014/10/15</a:t>
             </a:fld>
             <a:endParaRPr kumimoji="1" lang="ja-JP" altLang="en-US"/>
           </a:p>
@@ -2763,7 +2763,7 @@
           <a:p>
             <a:fld id="{FC956616-CD33-46B8-9478-BE04F8ED56F2}" type="datetimeFigureOut">
               <a:rPr kumimoji="1" lang="ja-JP" altLang="en-US" smtClean="0"/>
-              <a:t>2014/9/17</a:t>
+              <a:t>2014/10/15</a:t>
             </a:fld>
             <a:endParaRPr kumimoji="1" lang="ja-JP" altLang="en-US"/>
           </a:p>
@@ -3008,7 +3008,7 @@
           <a:p>
             <a:fld id="{FC956616-CD33-46B8-9478-BE04F8ED56F2}" type="datetimeFigureOut">
               <a:rPr kumimoji="1" lang="ja-JP" altLang="en-US" smtClean="0"/>
-              <a:t>2014/9/17</a:t>
+              <a:t>2014/10/15</a:t>
             </a:fld>
             <a:endParaRPr kumimoji="1" lang="ja-JP" altLang="en-US"/>
           </a:p>
@@ -3430,9 +3430,9 @@
         <p:grpSpPr>
           <a:xfrm>
             <a:off x="5772267" y="633954"/>
-            <a:ext cx="3192291" cy="3364227"/>
+            <a:ext cx="2611515" cy="3364227"/>
             <a:chOff x="5755541" y="360930"/>
-            <a:chExt cx="3192291" cy="3364227"/>
+            <a:chExt cx="2611515" cy="3364227"/>
           </a:xfrm>
         </p:grpSpPr>
         <p:sp>
@@ -3482,9 +3482,9 @@
           <p:grpSpPr>
             <a:xfrm>
               <a:off x="5755541" y="912120"/>
-              <a:ext cx="3192291" cy="2813037"/>
+              <a:ext cx="2611515" cy="2813037"/>
               <a:chOff x="5755541" y="1044169"/>
-              <a:chExt cx="3192291" cy="2813037"/>
+              <a:chExt cx="2611515" cy="2813037"/>
             </a:xfrm>
           </p:grpSpPr>
           <p:sp>
@@ -3964,7 +3964,7 @@
             <p:spPr>
               <a:xfrm>
                 <a:off x="7530709" y="1776888"/>
-                <a:ext cx="1417123" cy="338554"/>
+                <a:ext cx="836347" cy="338554"/>
               </a:xfrm>
               <a:prstGeom prst="rect">
                 <a:avLst/>
@@ -3982,7 +3982,7 @@
                     <a:latin typeface="Gungsuh" panose="02030600000101010101" pitchFamily="18" charset="-127"/>
                     <a:ea typeface="Gungsuh" panose="02030600000101010101" pitchFamily="18" charset="-127"/>
                   </a:rPr>
-                  <a:t>clear-vol</a:t>
+                  <a:t>clear</a:t>
                 </a:r>
                 <a:endParaRPr kumimoji="1" lang="ja-JP" altLang="en-US" sz="1600">
                   <a:latin typeface="Gungsuh" panose="02030600000101010101" pitchFamily="18" charset="-127"/>
@@ -4473,8 +4473,8 @@
           </p:nvSpPr>
           <p:spPr>
             <a:xfrm>
-              <a:off x="5536947" y="4519997"/>
-              <a:ext cx="1417123" cy="338554"/>
+              <a:off x="5536948" y="4519997"/>
+              <a:ext cx="974554" cy="338554"/>
             </a:xfrm>
             <a:prstGeom prst="rect">
               <a:avLst/>
@@ -4492,7 +4492,7 @@
                   <a:latin typeface="Gungsuh" panose="02030600000101010101" pitchFamily="18" charset="-127"/>
                   <a:ea typeface="Gungsuh" panose="02030600000101010101" pitchFamily="18" charset="-127"/>
                 </a:rPr>
-                <a:t>clear-vol</a:t>
+                <a:t>clear</a:t>
               </a:r>
               <a:endParaRPr kumimoji="1" lang="ja-JP" altLang="en-US" sz="1600">
                 <a:latin typeface="Gungsuh" panose="02030600000101010101" pitchFamily="18" charset="-127"/>
@@ -4509,8 +4509,8 @@
           </p:nvSpPr>
           <p:spPr>
             <a:xfrm>
-              <a:off x="3615202" y="4509121"/>
-              <a:ext cx="1166515" cy="338554"/>
+              <a:off x="4195715" y="4509121"/>
+              <a:ext cx="659602" cy="338554"/>
             </a:xfrm>
             <a:prstGeom prst="rect">
               <a:avLst/>
@@ -4529,13 +4529,6 @@
                   <a:ea typeface="Gungsuh" panose="02030600000101010101" pitchFamily="18" charset="-127"/>
                 </a:rPr>
                 <a:t>init</a:t>
-              </a:r>
-              <a:r>
-                <a:rPr kumimoji="1" lang="en-US" altLang="ja-JP" sz="1600" smtClean="0">
-                  <a:latin typeface="Gungsuh" panose="02030600000101010101" pitchFamily="18" charset="-127"/>
-                  <a:ea typeface="Gungsuh" panose="02030600000101010101" pitchFamily="18" charset="-127"/>
-                </a:rPr>
-                <a:t>-vol</a:t>
               </a:r>
               <a:endParaRPr kumimoji="1" lang="ja-JP" altLang="en-US" sz="1600">
                 <a:latin typeface="Gungsuh" panose="02030600000101010101" pitchFamily="18" charset="-127"/>
@@ -4782,8 +4775,8 @@
           </p:nvSpPr>
           <p:spPr>
             <a:xfrm>
-              <a:off x="4155925" y="5812232"/>
-              <a:ext cx="1486882" cy="338554"/>
+              <a:off x="4640831" y="5812232"/>
+              <a:ext cx="862558" cy="338554"/>
             </a:xfrm>
             <a:prstGeom prst="rect">
               <a:avLst/>
@@ -4801,7 +4794,7 @@
                   <a:latin typeface="Gungsuh" panose="02030600000101010101" pitchFamily="18" charset="-127"/>
                   <a:ea typeface="Gungsuh" panose="02030600000101010101" pitchFamily="18" charset="-127"/>
                 </a:rPr>
-                <a:t>reset-vol</a:t>
+                <a:t>reset</a:t>
               </a:r>
               <a:endParaRPr kumimoji="1" lang="ja-JP" altLang="en-US" sz="1600">
                 <a:latin typeface="Gungsuh" panose="02030600000101010101" pitchFamily="18" charset="-127"/>
@@ -4899,7 +4892,7 @@
           </p:nvSpPr>
           <p:spPr>
             <a:xfrm>
-              <a:off x="7057475" y="5981509"/>
+              <a:off x="7306634" y="5483760"/>
               <a:ext cx="815125" cy="338554"/>
             </a:xfrm>
             <a:prstGeom prst="rect">
@@ -4936,10 +4929,10 @@
         </p:nvGrpSpPr>
         <p:grpSpPr>
           <a:xfrm>
-            <a:off x="6475" y="651452"/>
-            <a:ext cx="5292366" cy="3467144"/>
-            <a:chOff x="-286" y="430590"/>
-            <a:chExt cx="5292366" cy="3467144"/>
+            <a:off x="153690" y="651452"/>
+            <a:ext cx="5145151" cy="3467144"/>
+            <a:chOff x="146929" y="430590"/>
+            <a:chExt cx="5145151" cy="3467144"/>
           </a:xfrm>
         </p:grpSpPr>
         <p:sp>
@@ -5450,8 +5443,8 @@
           </p:nvSpPr>
           <p:spPr>
             <a:xfrm>
-              <a:off x="1886138" y="1526758"/>
-              <a:ext cx="1417123" cy="338554"/>
+              <a:off x="1886138" y="1645448"/>
+              <a:ext cx="878901" cy="338554"/>
             </a:xfrm>
             <a:prstGeom prst="rect">
               <a:avLst/>
@@ -5469,7 +5462,7 @@
                   <a:latin typeface="Gungsuh" panose="02030600000101010101" pitchFamily="18" charset="-127"/>
                   <a:ea typeface="Gungsuh" panose="02030600000101010101" pitchFamily="18" charset="-127"/>
                 </a:rPr>
-                <a:t>clear-vol</a:t>
+                <a:t>clear</a:t>
               </a:r>
               <a:endParaRPr kumimoji="1" lang="ja-JP" altLang="en-US" sz="1600">
                 <a:latin typeface="Gungsuh" panose="02030600000101010101" pitchFamily="18" charset="-127"/>
@@ -5486,8 +5479,8 @@
           </p:nvSpPr>
           <p:spPr>
             <a:xfrm>
-              <a:off x="-286" y="1630971"/>
-              <a:ext cx="1166515" cy="338554"/>
+              <a:off x="503770" y="1630971"/>
+              <a:ext cx="677093" cy="338554"/>
             </a:xfrm>
             <a:prstGeom prst="rect">
               <a:avLst/>
@@ -5506,13 +5499,6 @@
                   <a:ea typeface="Gungsuh" panose="02030600000101010101" pitchFamily="18" charset="-127"/>
                 </a:rPr>
                 <a:t>init</a:t>
-              </a:r>
-              <a:r>
-                <a:rPr kumimoji="1" lang="en-US" altLang="ja-JP" sz="1600" smtClean="0">
-                  <a:latin typeface="Gungsuh" panose="02030600000101010101" pitchFamily="18" charset="-127"/>
-                  <a:ea typeface="Gungsuh" panose="02030600000101010101" pitchFamily="18" charset="-127"/>
-                </a:rPr>
-                <a:t>-vol</a:t>
               </a:r>
               <a:endParaRPr kumimoji="1" lang="ja-JP" altLang="en-US" sz="1600">
                 <a:latin typeface="Gungsuh" panose="02030600000101010101" pitchFamily="18" charset="-127"/>
@@ -5844,7 +5830,7 @@
                   <a:latin typeface="Gungsuh" panose="02030600000101010101" pitchFamily="18" charset="-127"/>
                   <a:ea typeface="Gungsuh" panose="02030600000101010101" pitchFamily="18" charset="-127"/>
                 </a:rPr>
-                <a:t>reset-vol</a:t>
+                <a:t>reset</a:t>
               </a:r>
               <a:endParaRPr kumimoji="1" lang="ja-JP" altLang="en-US" sz="1600">
                 <a:latin typeface="Gungsuh" panose="02030600000101010101" pitchFamily="18" charset="-127"/>

</xml_diff>

<commit_message>
rename master/slave in pptx
</commit_message>
<xml_diff>
--- a/doc/state-cmd.pptx
+++ b/doc/state-cmd.pptx
@@ -288,7 +288,7 @@
           <a:p>
             <a:fld id="{FC956616-CD33-46B8-9478-BE04F8ED56F2}" type="datetimeFigureOut">
               <a:rPr kumimoji="1" lang="ja-JP" altLang="en-US" smtClean="0"/>
-              <a:t>2014/10/15</a:t>
+              <a:t>2014/12/2</a:t>
             </a:fld>
             <a:endParaRPr kumimoji="1" lang="ja-JP" altLang="en-US"/>
           </a:p>
@@ -490,7 +490,7 @@
           <a:p>
             <a:fld id="{FC956616-CD33-46B8-9478-BE04F8ED56F2}" type="datetimeFigureOut">
               <a:rPr kumimoji="1" lang="ja-JP" altLang="en-US" smtClean="0"/>
-              <a:t>2014/10/15</a:t>
+              <a:t>2014/12/2</a:t>
             </a:fld>
             <a:endParaRPr kumimoji="1" lang="ja-JP" altLang="en-US"/>
           </a:p>
@@ -702,7 +702,7 @@
           <a:p>
             <a:fld id="{FC956616-CD33-46B8-9478-BE04F8ED56F2}" type="datetimeFigureOut">
               <a:rPr kumimoji="1" lang="ja-JP" altLang="en-US" smtClean="0"/>
-              <a:t>2014/10/15</a:t>
+              <a:t>2014/12/2</a:t>
             </a:fld>
             <a:endParaRPr kumimoji="1" lang="ja-JP" altLang="en-US"/>
           </a:p>
@@ -904,7 +904,7 @@
           <a:p>
             <a:fld id="{FC956616-CD33-46B8-9478-BE04F8ED56F2}" type="datetimeFigureOut">
               <a:rPr kumimoji="1" lang="ja-JP" altLang="en-US" smtClean="0"/>
-              <a:t>2014/10/15</a:t>
+              <a:t>2014/12/2</a:t>
             </a:fld>
             <a:endParaRPr kumimoji="1" lang="ja-JP" altLang="en-US"/>
           </a:p>
@@ -1150,7 +1150,7 @@
           <a:p>
             <a:fld id="{FC956616-CD33-46B8-9478-BE04F8ED56F2}" type="datetimeFigureOut">
               <a:rPr kumimoji="1" lang="ja-JP" altLang="en-US" smtClean="0"/>
-              <a:t>2014/10/15</a:t>
+              <a:t>2014/12/2</a:t>
             </a:fld>
             <a:endParaRPr kumimoji="1" lang="ja-JP" altLang="en-US"/>
           </a:p>
@@ -1502,7 +1502,7 @@
           <a:p>
             <a:fld id="{FC956616-CD33-46B8-9478-BE04F8ED56F2}" type="datetimeFigureOut">
               <a:rPr kumimoji="1" lang="ja-JP" altLang="en-US" smtClean="0"/>
-              <a:t>2014/10/15</a:t>
+              <a:t>2014/12/2</a:t>
             </a:fld>
             <a:endParaRPr kumimoji="1" lang="ja-JP" altLang="en-US"/>
           </a:p>
@@ -1988,7 +1988,7 @@
           <a:p>
             <a:fld id="{FC956616-CD33-46B8-9478-BE04F8ED56F2}" type="datetimeFigureOut">
               <a:rPr kumimoji="1" lang="ja-JP" altLang="en-US" smtClean="0"/>
-              <a:t>2014/10/15</a:t>
+              <a:t>2014/12/2</a:t>
             </a:fld>
             <a:endParaRPr kumimoji="1" lang="ja-JP" altLang="en-US"/>
           </a:p>
@@ -2106,7 +2106,7 @@
           <a:p>
             <a:fld id="{FC956616-CD33-46B8-9478-BE04F8ED56F2}" type="datetimeFigureOut">
               <a:rPr kumimoji="1" lang="ja-JP" altLang="en-US" smtClean="0"/>
-              <a:t>2014/10/15</a:t>
+              <a:t>2014/12/2</a:t>
             </a:fld>
             <a:endParaRPr kumimoji="1" lang="ja-JP" altLang="en-US"/>
           </a:p>
@@ -2201,7 +2201,7 @@
           <a:p>
             <a:fld id="{FC956616-CD33-46B8-9478-BE04F8ED56F2}" type="datetimeFigureOut">
               <a:rPr kumimoji="1" lang="ja-JP" altLang="en-US" smtClean="0"/>
-              <a:t>2014/10/15</a:t>
+              <a:t>2014/12/2</a:t>
             </a:fld>
             <a:endParaRPr kumimoji="1" lang="ja-JP" altLang="en-US"/>
           </a:p>
@@ -2510,7 +2510,7 @@
           <a:p>
             <a:fld id="{FC956616-CD33-46B8-9478-BE04F8ED56F2}" type="datetimeFigureOut">
               <a:rPr kumimoji="1" lang="ja-JP" altLang="en-US" smtClean="0"/>
-              <a:t>2014/10/15</a:t>
+              <a:t>2014/12/2</a:t>
             </a:fld>
             <a:endParaRPr kumimoji="1" lang="ja-JP" altLang="en-US"/>
           </a:p>
@@ -2763,7 +2763,7 @@
           <a:p>
             <a:fld id="{FC956616-CD33-46B8-9478-BE04F8ED56F2}" type="datetimeFigureOut">
               <a:rPr kumimoji="1" lang="ja-JP" altLang="en-US" smtClean="0"/>
-              <a:t>2014/10/15</a:t>
+              <a:t>2014/12/2</a:t>
             </a:fld>
             <a:endParaRPr kumimoji="1" lang="ja-JP" altLang="en-US"/>
           </a:p>
@@ -3008,7 +3008,7 @@
           <a:p>
             <a:fld id="{FC956616-CD33-46B8-9478-BE04F8ED56F2}" type="datetimeFigureOut">
               <a:rPr kumimoji="1" lang="ja-JP" altLang="en-US" smtClean="0"/>
-              <a:t>2014/10/15</a:t>
+              <a:t>2014/12/2</a:t>
             </a:fld>
             <a:endParaRPr kumimoji="1" lang="ja-JP" altLang="en-US"/>
           </a:p>
@@ -5081,7 +5081,7 @@
                     <a:schemeClr val="tx1"/>
                   </a:solidFill>
                 </a:rPr>
-                <a:t>Master</a:t>
+                <a:t>Target</a:t>
               </a:r>
               <a:endParaRPr kumimoji="1" lang="ja-JP" altLang="en-US">
                 <a:solidFill>
@@ -5159,7 +5159,7 @@
                     <a:schemeClr val="tx1"/>
                   </a:solidFill>
                 </a:rPr>
-                <a:t>Slave</a:t>
+                <a:t>Standby</a:t>
               </a:r>
               <a:endParaRPr kumimoji="1" lang="ja-JP" altLang="en-US">
                 <a:solidFill>
@@ -5950,7 +5950,7 @@
                   <a:latin typeface="Gungsuh" panose="02030600000101010101" pitchFamily="18" charset="-127"/>
                   <a:ea typeface="Gungsuh" panose="02030600000101010101" pitchFamily="18" charset="-127"/>
                 </a:rPr>
-                <a:t>start</a:t>
+                <a:t>go</a:t>
               </a:r>
             </a:p>
             <a:p>

</xml_diff>

<commit_message>
fix state of storage
</commit_message>
<xml_diff>
--- a/doc/state-cmd.pptx
+++ b/doc/state-cmd.pptx
@@ -288,7 +288,7 @@
           <a:p>
             <a:fld id="{FC956616-CD33-46B8-9478-BE04F8ED56F2}" type="datetimeFigureOut">
               <a:rPr kumimoji="1" lang="ja-JP" altLang="en-US" smtClean="0"/>
-              <a:t>2014/12/2</a:t>
+              <a:t>2014/12/8</a:t>
             </a:fld>
             <a:endParaRPr kumimoji="1" lang="ja-JP" altLang="en-US"/>
           </a:p>
@@ -490,7 +490,7 @@
           <a:p>
             <a:fld id="{FC956616-CD33-46B8-9478-BE04F8ED56F2}" type="datetimeFigureOut">
               <a:rPr kumimoji="1" lang="ja-JP" altLang="en-US" smtClean="0"/>
-              <a:t>2014/12/2</a:t>
+              <a:t>2014/12/8</a:t>
             </a:fld>
             <a:endParaRPr kumimoji="1" lang="ja-JP" altLang="en-US"/>
           </a:p>
@@ -702,7 +702,7 @@
           <a:p>
             <a:fld id="{FC956616-CD33-46B8-9478-BE04F8ED56F2}" type="datetimeFigureOut">
               <a:rPr kumimoji="1" lang="ja-JP" altLang="en-US" smtClean="0"/>
-              <a:t>2014/12/2</a:t>
+              <a:t>2014/12/8</a:t>
             </a:fld>
             <a:endParaRPr kumimoji="1" lang="ja-JP" altLang="en-US"/>
           </a:p>
@@ -904,7 +904,7 @@
           <a:p>
             <a:fld id="{FC956616-CD33-46B8-9478-BE04F8ED56F2}" type="datetimeFigureOut">
               <a:rPr kumimoji="1" lang="ja-JP" altLang="en-US" smtClean="0"/>
-              <a:t>2014/12/2</a:t>
+              <a:t>2014/12/8</a:t>
             </a:fld>
             <a:endParaRPr kumimoji="1" lang="ja-JP" altLang="en-US"/>
           </a:p>
@@ -1150,7 +1150,7 @@
           <a:p>
             <a:fld id="{FC956616-CD33-46B8-9478-BE04F8ED56F2}" type="datetimeFigureOut">
               <a:rPr kumimoji="1" lang="ja-JP" altLang="en-US" smtClean="0"/>
-              <a:t>2014/12/2</a:t>
+              <a:t>2014/12/8</a:t>
             </a:fld>
             <a:endParaRPr kumimoji="1" lang="ja-JP" altLang="en-US"/>
           </a:p>
@@ -1502,7 +1502,7 @@
           <a:p>
             <a:fld id="{FC956616-CD33-46B8-9478-BE04F8ED56F2}" type="datetimeFigureOut">
               <a:rPr kumimoji="1" lang="ja-JP" altLang="en-US" smtClean="0"/>
-              <a:t>2014/12/2</a:t>
+              <a:t>2014/12/8</a:t>
             </a:fld>
             <a:endParaRPr kumimoji="1" lang="ja-JP" altLang="en-US"/>
           </a:p>
@@ -1988,7 +1988,7 @@
           <a:p>
             <a:fld id="{FC956616-CD33-46B8-9478-BE04F8ED56F2}" type="datetimeFigureOut">
               <a:rPr kumimoji="1" lang="ja-JP" altLang="en-US" smtClean="0"/>
-              <a:t>2014/12/2</a:t>
+              <a:t>2014/12/8</a:t>
             </a:fld>
             <a:endParaRPr kumimoji="1" lang="ja-JP" altLang="en-US"/>
           </a:p>
@@ -2106,7 +2106,7 @@
           <a:p>
             <a:fld id="{FC956616-CD33-46B8-9478-BE04F8ED56F2}" type="datetimeFigureOut">
               <a:rPr kumimoji="1" lang="ja-JP" altLang="en-US" smtClean="0"/>
-              <a:t>2014/12/2</a:t>
+              <a:t>2014/12/8</a:t>
             </a:fld>
             <a:endParaRPr kumimoji="1" lang="ja-JP" altLang="en-US"/>
           </a:p>
@@ -2201,7 +2201,7 @@
           <a:p>
             <a:fld id="{FC956616-CD33-46B8-9478-BE04F8ED56F2}" type="datetimeFigureOut">
               <a:rPr kumimoji="1" lang="ja-JP" altLang="en-US" smtClean="0"/>
-              <a:t>2014/12/2</a:t>
+              <a:t>2014/12/8</a:t>
             </a:fld>
             <a:endParaRPr kumimoji="1" lang="ja-JP" altLang="en-US"/>
           </a:p>
@@ -2510,7 +2510,7 @@
           <a:p>
             <a:fld id="{FC956616-CD33-46B8-9478-BE04F8ED56F2}" type="datetimeFigureOut">
               <a:rPr kumimoji="1" lang="ja-JP" altLang="en-US" smtClean="0"/>
-              <a:t>2014/12/2</a:t>
+              <a:t>2014/12/8</a:t>
             </a:fld>
             <a:endParaRPr kumimoji="1" lang="ja-JP" altLang="en-US"/>
           </a:p>
@@ -2763,7 +2763,7 @@
           <a:p>
             <a:fld id="{FC956616-CD33-46B8-9478-BE04F8ED56F2}" type="datetimeFigureOut">
               <a:rPr kumimoji="1" lang="ja-JP" altLang="en-US" smtClean="0"/>
-              <a:t>2014/12/2</a:t>
+              <a:t>2014/12/8</a:t>
             </a:fld>
             <a:endParaRPr kumimoji="1" lang="ja-JP" altLang="en-US"/>
           </a:p>
@@ -3008,7 +3008,7 @@
           <a:p>
             <a:fld id="{FC956616-CD33-46B8-9478-BE04F8ED56F2}" type="datetimeFigureOut">
               <a:rPr kumimoji="1" lang="ja-JP" altLang="en-US" smtClean="0"/>
-              <a:t>2014/12/2</a:t>
+              <a:t>2014/12/8</a:t>
             </a:fld>
             <a:endParaRPr kumimoji="1" lang="ja-JP" altLang="en-US"/>
           </a:p>
@@ -4037,10 +4037,10 @@
         </p:nvGrpSpPr>
         <p:grpSpPr>
           <a:xfrm>
-            <a:off x="2339752" y="3893961"/>
-            <a:ext cx="6295530" cy="2847407"/>
-            <a:chOff x="2623069" y="3893961"/>
-            <a:chExt cx="6295530" cy="2847407"/>
+            <a:off x="2689817" y="3893961"/>
+            <a:ext cx="5945465" cy="2847407"/>
+            <a:chOff x="2973134" y="3893961"/>
+            <a:chExt cx="5945465" cy="2847407"/>
           </a:xfrm>
         </p:grpSpPr>
         <p:sp>
@@ -4051,7 +4051,7 @@
           </p:nvSpPr>
           <p:spPr>
             <a:xfrm>
-              <a:off x="2623069" y="5189038"/>
+              <a:off x="2973134" y="5222150"/>
               <a:ext cx="1694031" cy="523220"/>
             </a:xfrm>
             <a:prstGeom prst="rect">
@@ -4921,1126 +4921,1140 @@
           </p:txBody>
         </p:sp>
       </p:grpSp>
-      <p:grpSp>
-        <p:nvGrpSpPr>
-          <p:cNvPr id="154" name="グループ化 153"/>
-          <p:cNvGrpSpPr/>
+      <p:sp>
+        <p:nvSpPr>
+          <p:cNvPr id="10" name="角丸四角形 9"/>
+          <p:cNvSpPr/>
           <p:nvPr/>
-        </p:nvGrpSpPr>
-        <p:grpSpPr>
+        </p:nvSpPr>
+        <p:spPr>
           <a:xfrm>
-            <a:off x="153690" y="651452"/>
-            <a:ext cx="5145151" cy="3467144"/>
-            <a:chOff x="146929" y="430590"/>
-            <a:chExt cx="5145151" cy="3467144"/>
+            <a:off x="899592" y="3968091"/>
+            <a:ext cx="1296144" cy="504056"/>
           </a:xfrm>
-        </p:grpSpPr>
-        <p:sp>
-          <p:nvSpPr>
-            <p:cNvPr id="10" name="角丸四角形 9"/>
-            <p:cNvSpPr/>
-            <p:nvPr/>
-          </p:nvSpPr>
-          <p:spPr>
-            <a:xfrm>
-              <a:off x="3984726" y="2082334"/>
-              <a:ext cx="1296144" cy="504056"/>
-            </a:xfrm>
-            <a:prstGeom prst="roundRect">
-              <a:avLst/>
-            </a:prstGeom>
-            <a:gradFill>
-              <a:gsLst>
-                <a:gs pos="0">
-                  <a:schemeClr val="accent1">
-                    <a:tint val="66000"/>
-                    <a:satMod val="160000"/>
-                  </a:schemeClr>
-                </a:gs>
-                <a:gs pos="50000">
-                  <a:schemeClr val="accent1">
-                    <a:tint val="44500"/>
-                    <a:satMod val="160000"/>
-                  </a:schemeClr>
-                </a:gs>
-                <a:gs pos="100000">
-                  <a:schemeClr val="accent1">
-                    <a:tint val="23500"/>
-                    <a:satMod val="160000"/>
-                  </a:schemeClr>
-                </a:gs>
-              </a:gsLst>
-              <a:lin ang="5400000" scaled="0"/>
-            </a:gradFill>
-            <a:ln>
-              <a:noFill/>
-            </a:ln>
-          </p:spPr>
-          <p:style>
-            <a:lnRef idx="2">
-              <a:schemeClr val="accent1">
-                <a:shade val="50000"/>
-              </a:schemeClr>
-            </a:lnRef>
-            <a:fillRef idx="1">
-              <a:schemeClr val="accent1"/>
-            </a:fillRef>
-            <a:effectRef idx="0">
-              <a:schemeClr val="accent1"/>
-            </a:effectRef>
-            <a:fontRef idx="minor">
-              <a:schemeClr val="lt1"/>
-            </a:fontRef>
-          </p:style>
-          <p:txBody>
-            <a:bodyPr rtlCol="0" anchor="ctr"/>
-            <a:lstStyle/>
-            <a:p>
-              <a:pPr algn="ctr"/>
-              <a:r>
-                <a:rPr lang="en-US" altLang="ja-JP" smtClean="0">
-                  <a:solidFill>
-                    <a:schemeClr val="tx1"/>
-                  </a:solidFill>
-                </a:rPr>
-                <a:t>Stopped</a:t>
-              </a:r>
-              <a:endParaRPr kumimoji="1" lang="ja-JP" altLang="en-US">
+          <a:prstGeom prst="roundRect">
+            <a:avLst/>
+          </a:prstGeom>
+          <a:gradFill>
+            <a:gsLst>
+              <a:gs pos="0">
+                <a:schemeClr val="accent1">
+                  <a:tint val="66000"/>
+                  <a:satMod val="160000"/>
+                </a:schemeClr>
+              </a:gs>
+              <a:gs pos="50000">
+                <a:schemeClr val="accent1">
+                  <a:tint val="44500"/>
+                  <a:satMod val="160000"/>
+                </a:schemeClr>
+              </a:gs>
+              <a:gs pos="100000">
+                <a:schemeClr val="accent1">
+                  <a:tint val="23500"/>
+                  <a:satMod val="160000"/>
+                </a:schemeClr>
+              </a:gs>
+            </a:gsLst>
+            <a:lin ang="5400000" scaled="0"/>
+          </a:gradFill>
+          <a:ln>
+            <a:noFill/>
+          </a:ln>
+        </p:spPr>
+        <p:style>
+          <a:lnRef idx="2">
+            <a:schemeClr val="accent1">
+              <a:shade val="50000"/>
+            </a:schemeClr>
+          </a:lnRef>
+          <a:fillRef idx="1">
+            <a:schemeClr val="accent1"/>
+          </a:fillRef>
+          <a:effectRef idx="0">
+            <a:schemeClr val="accent1"/>
+          </a:effectRef>
+          <a:fontRef idx="minor">
+            <a:schemeClr val="lt1"/>
+          </a:fontRef>
+        </p:style>
+        <p:txBody>
+          <a:bodyPr rtlCol="0" anchor="ctr"/>
+          <a:lstStyle/>
+          <a:p>
+            <a:pPr algn="ctr"/>
+            <a:r>
+              <a:rPr lang="en-US" altLang="ja-JP" smtClean="0">
                 <a:solidFill>
                   <a:schemeClr val="tx1"/>
                 </a:solidFill>
-              </a:endParaRPr>
-            </a:p>
-          </p:txBody>
-        </p:sp>
-        <p:sp>
-          <p:nvSpPr>
-            <p:cNvPr id="11" name="角丸四角形 10"/>
-            <p:cNvSpPr/>
-            <p:nvPr/>
-          </p:nvSpPr>
-          <p:spPr>
-            <a:xfrm>
-              <a:off x="1834157" y="3393614"/>
-              <a:ext cx="1296144" cy="504056"/>
-            </a:xfrm>
-            <a:prstGeom prst="roundRect">
-              <a:avLst/>
-            </a:prstGeom>
-            <a:gradFill>
-              <a:gsLst>
-                <a:gs pos="0">
-                  <a:schemeClr val="accent1">
-                    <a:tint val="66000"/>
-                    <a:satMod val="160000"/>
-                  </a:schemeClr>
-                </a:gs>
-                <a:gs pos="50000">
-                  <a:schemeClr val="accent1">
-                    <a:tint val="44500"/>
-                    <a:satMod val="160000"/>
-                  </a:schemeClr>
-                </a:gs>
-                <a:gs pos="100000">
-                  <a:schemeClr val="accent1">
-                    <a:tint val="23500"/>
-                    <a:satMod val="160000"/>
-                  </a:schemeClr>
-                </a:gs>
-              </a:gsLst>
-              <a:lin ang="5400000" scaled="0"/>
-            </a:gradFill>
-            <a:ln>
-              <a:noFill/>
-            </a:ln>
-          </p:spPr>
-          <p:style>
-            <a:lnRef idx="2">
-              <a:schemeClr val="accent1">
-                <a:shade val="50000"/>
-              </a:schemeClr>
-            </a:lnRef>
-            <a:fillRef idx="1">
-              <a:schemeClr val="accent1"/>
-            </a:fillRef>
-            <a:effectRef idx="0">
-              <a:schemeClr val="accent1"/>
-            </a:effectRef>
-            <a:fontRef idx="minor">
-              <a:schemeClr val="lt1"/>
-            </a:fontRef>
-          </p:style>
-          <p:txBody>
-            <a:bodyPr rtlCol="0" anchor="ctr"/>
-            <a:lstStyle/>
-            <a:p>
-              <a:pPr algn="ctr"/>
-              <a:r>
-                <a:rPr kumimoji="1" lang="en-US" altLang="ja-JP" smtClean="0">
-                  <a:solidFill>
-                    <a:schemeClr val="tx1"/>
-                  </a:solidFill>
-                </a:rPr>
-                <a:t>Target</a:t>
-              </a:r>
-              <a:endParaRPr kumimoji="1" lang="ja-JP" altLang="en-US">
+              </a:rPr>
+              <a:t>Stopped</a:t>
+            </a:r>
+            <a:endParaRPr kumimoji="1" lang="ja-JP" altLang="en-US">
+              <a:solidFill>
+                <a:schemeClr val="tx1"/>
+              </a:solidFill>
+            </a:endParaRPr>
+          </a:p>
+        </p:txBody>
+      </p:sp>
+      <p:sp>
+        <p:nvSpPr>
+          <p:cNvPr id="11" name="角丸四角形 10"/>
+          <p:cNvSpPr/>
+          <p:nvPr/>
+        </p:nvSpPr>
+        <p:spPr>
+          <a:xfrm>
+            <a:off x="899592" y="5085184"/>
+            <a:ext cx="1296144" cy="504056"/>
+          </a:xfrm>
+          <a:prstGeom prst="roundRect">
+            <a:avLst/>
+          </a:prstGeom>
+          <a:gradFill>
+            <a:gsLst>
+              <a:gs pos="0">
+                <a:schemeClr val="accent1">
+                  <a:tint val="66000"/>
+                  <a:satMod val="160000"/>
+                </a:schemeClr>
+              </a:gs>
+              <a:gs pos="50000">
+                <a:schemeClr val="accent1">
+                  <a:tint val="44500"/>
+                  <a:satMod val="160000"/>
+                </a:schemeClr>
+              </a:gs>
+              <a:gs pos="100000">
+                <a:schemeClr val="accent1">
+                  <a:tint val="23500"/>
+                  <a:satMod val="160000"/>
+                </a:schemeClr>
+              </a:gs>
+            </a:gsLst>
+            <a:lin ang="5400000" scaled="0"/>
+          </a:gradFill>
+          <a:ln>
+            <a:noFill/>
+          </a:ln>
+        </p:spPr>
+        <p:style>
+          <a:lnRef idx="2">
+            <a:schemeClr val="accent1">
+              <a:shade val="50000"/>
+            </a:schemeClr>
+          </a:lnRef>
+          <a:fillRef idx="1">
+            <a:schemeClr val="accent1"/>
+          </a:fillRef>
+          <a:effectRef idx="0">
+            <a:schemeClr val="accent1"/>
+          </a:effectRef>
+          <a:fontRef idx="minor">
+            <a:schemeClr val="lt1"/>
+          </a:fontRef>
+        </p:style>
+        <p:txBody>
+          <a:bodyPr rtlCol="0" anchor="ctr"/>
+          <a:lstStyle/>
+          <a:p>
+            <a:pPr algn="ctr"/>
+            <a:r>
+              <a:rPr kumimoji="1" lang="en-US" altLang="ja-JP" smtClean="0">
                 <a:solidFill>
                   <a:schemeClr val="tx1"/>
                 </a:solidFill>
-              </a:endParaRPr>
-            </a:p>
-          </p:txBody>
-        </p:sp>
-        <p:sp>
-          <p:nvSpPr>
-            <p:cNvPr id="12" name="角丸四角形 11"/>
-            <p:cNvSpPr/>
-            <p:nvPr/>
-          </p:nvSpPr>
-          <p:spPr>
-            <a:xfrm>
-              <a:off x="146929" y="3393678"/>
-              <a:ext cx="1296144" cy="504056"/>
-            </a:xfrm>
-            <a:prstGeom prst="roundRect">
-              <a:avLst/>
-            </a:prstGeom>
-            <a:gradFill>
-              <a:gsLst>
-                <a:gs pos="0">
-                  <a:schemeClr val="accent1">
-                    <a:tint val="66000"/>
-                    <a:satMod val="160000"/>
-                  </a:schemeClr>
-                </a:gs>
-                <a:gs pos="50000">
-                  <a:schemeClr val="accent1">
-                    <a:tint val="44500"/>
-                    <a:satMod val="160000"/>
-                  </a:schemeClr>
-                </a:gs>
-                <a:gs pos="100000">
-                  <a:schemeClr val="accent1">
-                    <a:tint val="23500"/>
-                    <a:satMod val="160000"/>
-                  </a:schemeClr>
-                </a:gs>
-              </a:gsLst>
-              <a:lin ang="5400000" scaled="0"/>
-            </a:gradFill>
-            <a:ln>
-              <a:noFill/>
-            </a:ln>
-          </p:spPr>
-          <p:style>
-            <a:lnRef idx="2">
-              <a:schemeClr val="accent1">
-                <a:shade val="50000"/>
-              </a:schemeClr>
-            </a:lnRef>
-            <a:fillRef idx="1">
-              <a:schemeClr val="accent1"/>
-            </a:fillRef>
-            <a:effectRef idx="0">
-              <a:schemeClr val="accent1"/>
-            </a:effectRef>
-            <a:fontRef idx="minor">
-              <a:schemeClr val="lt1"/>
-            </a:fontRef>
-          </p:style>
-          <p:txBody>
-            <a:bodyPr rtlCol="0" anchor="ctr"/>
-            <a:lstStyle/>
-            <a:p>
-              <a:pPr algn="ctr"/>
-              <a:r>
-                <a:rPr kumimoji="1" lang="en-US" altLang="ja-JP" smtClean="0">
-                  <a:solidFill>
-                    <a:schemeClr val="tx1"/>
-                  </a:solidFill>
-                </a:rPr>
-                <a:t>Standby</a:t>
-              </a:r>
-              <a:endParaRPr kumimoji="1" lang="ja-JP" altLang="en-US">
+              </a:rPr>
+              <a:t>Target</a:t>
+            </a:r>
+            <a:endParaRPr kumimoji="1" lang="ja-JP" altLang="en-US">
+              <a:solidFill>
+                <a:schemeClr val="tx1"/>
+              </a:solidFill>
+            </a:endParaRPr>
+          </a:p>
+        </p:txBody>
+      </p:sp>
+      <p:sp>
+        <p:nvSpPr>
+          <p:cNvPr id="12" name="角丸四角形 11"/>
+          <p:cNvSpPr/>
+          <p:nvPr/>
+        </p:nvSpPr>
+        <p:spPr>
+          <a:xfrm>
+            <a:off x="4139952" y="2282007"/>
+            <a:ext cx="1296144" cy="504056"/>
+          </a:xfrm>
+          <a:prstGeom prst="roundRect">
+            <a:avLst/>
+          </a:prstGeom>
+          <a:gradFill>
+            <a:gsLst>
+              <a:gs pos="0">
+                <a:schemeClr val="accent1">
+                  <a:tint val="66000"/>
+                  <a:satMod val="160000"/>
+                </a:schemeClr>
+              </a:gs>
+              <a:gs pos="50000">
+                <a:schemeClr val="accent1">
+                  <a:tint val="44500"/>
+                  <a:satMod val="160000"/>
+                </a:schemeClr>
+              </a:gs>
+              <a:gs pos="100000">
+                <a:schemeClr val="accent1">
+                  <a:tint val="23500"/>
+                  <a:satMod val="160000"/>
+                </a:schemeClr>
+              </a:gs>
+            </a:gsLst>
+            <a:lin ang="5400000" scaled="0"/>
+          </a:gradFill>
+          <a:ln>
+            <a:noFill/>
+          </a:ln>
+        </p:spPr>
+        <p:style>
+          <a:lnRef idx="2">
+            <a:schemeClr val="accent1">
+              <a:shade val="50000"/>
+            </a:schemeClr>
+          </a:lnRef>
+          <a:fillRef idx="1">
+            <a:schemeClr val="accent1"/>
+          </a:fillRef>
+          <a:effectRef idx="0">
+            <a:schemeClr val="accent1"/>
+          </a:effectRef>
+          <a:fontRef idx="minor">
+            <a:schemeClr val="lt1"/>
+          </a:fontRef>
+        </p:style>
+        <p:txBody>
+          <a:bodyPr rtlCol="0" anchor="ctr"/>
+          <a:lstStyle/>
+          <a:p>
+            <a:pPr algn="ctr"/>
+            <a:r>
+              <a:rPr kumimoji="1" lang="en-US" altLang="ja-JP" smtClean="0">
                 <a:solidFill>
                   <a:schemeClr val="tx1"/>
                 </a:solidFill>
-              </a:endParaRPr>
-            </a:p>
-          </p:txBody>
-        </p:sp>
-        <p:sp>
-          <p:nvSpPr>
-            <p:cNvPr id="24" name="テキスト ボックス 23"/>
-            <p:cNvSpPr txBox="1"/>
-            <p:nvPr/>
-          </p:nvSpPr>
-          <p:spPr>
-            <a:xfrm>
-              <a:off x="900668" y="430590"/>
-              <a:ext cx="1694031" cy="523220"/>
-            </a:xfrm>
-            <a:prstGeom prst="rect">
-              <a:avLst/>
-            </a:prstGeom>
-            <a:noFill/>
-          </p:spPr>
-          <p:txBody>
-            <a:bodyPr wrap="square" rtlCol="0">
-              <a:spAutoFit/>
-            </a:bodyPr>
-            <a:lstStyle/>
-            <a:p>
-              <a:r>
-                <a:rPr kumimoji="1" lang="en-US" altLang="ja-JP" sz="2800" smtClean="0">
-                  <a:latin typeface="Arial Unicode MS" panose="020B0604020202020204" pitchFamily="50" charset="-128"/>
-                  <a:ea typeface="Arial Unicode MS" panose="020B0604020202020204" pitchFamily="50" charset="-128"/>
-                  <a:cs typeface="Arial Unicode MS" panose="020B0604020202020204" pitchFamily="50" charset="-128"/>
-                </a:rPr>
-                <a:t>Storage</a:t>
-              </a:r>
-              <a:endParaRPr kumimoji="1" lang="ja-JP" altLang="en-US" sz="2800">
+              </a:rPr>
+              <a:t>Standby</a:t>
+            </a:r>
+            <a:endParaRPr kumimoji="1" lang="ja-JP" altLang="en-US">
+              <a:solidFill>
+                <a:schemeClr val="tx1"/>
+              </a:solidFill>
+            </a:endParaRPr>
+          </a:p>
+        </p:txBody>
+      </p:sp>
+      <p:sp>
+        <p:nvSpPr>
+          <p:cNvPr id="24" name="テキスト ボックス 23"/>
+          <p:cNvSpPr txBox="1"/>
+          <p:nvPr/>
+        </p:nvSpPr>
+        <p:spPr>
+          <a:xfrm>
+            <a:off x="907429" y="651452"/>
+            <a:ext cx="1694031" cy="523220"/>
+          </a:xfrm>
+          <a:prstGeom prst="rect">
+            <a:avLst/>
+          </a:prstGeom>
+          <a:noFill/>
+        </p:spPr>
+        <p:txBody>
+          <a:bodyPr wrap="square" rtlCol="0">
+            <a:spAutoFit/>
+          </a:bodyPr>
+          <a:lstStyle/>
+          <a:p>
+            <a:r>
+              <a:rPr kumimoji="1" lang="en-US" altLang="ja-JP" sz="2800" smtClean="0">
                 <a:latin typeface="Arial Unicode MS" panose="020B0604020202020204" pitchFamily="50" charset="-128"/>
                 <a:ea typeface="Arial Unicode MS" panose="020B0604020202020204" pitchFamily="50" charset="-128"/>
                 <a:cs typeface="Arial Unicode MS" panose="020B0604020202020204" pitchFamily="50" charset="-128"/>
-              </a:endParaRPr>
-            </a:p>
-          </p:txBody>
-        </p:sp>
-        <p:sp>
-          <p:nvSpPr>
-            <p:cNvPr id="126" name="角丸四角形 125"/>
-            <p:cNvSpPr/>
-            <p:nvPr/>
-          </p:nvSpPr>
-          <p:spPr>
-            <a:xfrm>
-              <a:off x="915621" y="2082334"/>
-              <a:ext cx="1296144" cy="504056"/>
-            </a:xfrm>
-            <a:prstGeom prst="roundRect">
-              <a:avLst/>
-            </a:prstGeom>
-            <a:gradFill>
-              <a:gsLst>
-                <a:gs pos="0">
-                  <a:schemeClr val="accent1">
-                    <a:tint val="66000"/>
-                    <a:satMod val="160000"/>
-                  </a:schemeClr>
-                </a:gs>
-                <a:gs pos="50000">
-                  <a:schemeClr val="accent1">
-                    <a:tint val="44500"/>
-                    <a:satMod val="160000"/>
-                  </a:schemeClr>
-                </a:gs>
-                <a:gs pos="100000">
-                  <a:schemeClr val="accent1">
-                    <a:tint val="23500"/>
-                    <a:satMod val="160000"/>
-                  </a:schemeClr>
-                </a:gs>
-              </a:gsLst>
-              <a:lin ang="5400000" scaled="0"/>
-            </a:gradFill>
-            <a:ln>
-              <a:noFill/>
-            </a:ln>
-          </p:spPr>
-          <p:style>
-            <a:lnRef idx="2">
-              <a:schemeClr val="accent1">
-                <a:shade val="50000"/>
-              </a:schemeClr>
-            </a:lnRef>
-            <a:fillRef idx="1">
-              <a:schemeClr val="accent1"/>
-            </a:fillRef>
-            <a:effectRef idx="0">
-              <a:schemeClr val="accent1"/>
-            </a:effectRef>
-            <a:fontRef idx="minor">
-              <a:schemeClr val="lt1"/>
-            </a:fontRef>
-          </p:style>
-          <p:txBody>
-            <a:bodyPr rtlCol="0" anchor="ctr"/>
-            <a:lstStyle/>
-            <a:p>
-              <a:pPr algn="ctr"/>
-              <a:r>
-                <a:rPr kumimoji="1" lang="en-US" altLang="ja-JP" smtClean="0">
-                  <a:solidFill>
-                    <a:schemeClr val="tx1"/>
-                  </a:solidFill>
-                </a:rPr>
-                <a:t>SyncReady</a:t>
-              </a:r>
-              <a:endParaRPr kumimoji="1" lang="ja-JP" altLang="en-US">
+              </a:rPr>
+              <a:t>Storage</a:t>
+            </a:r>
+            <a:endParaRPr kumimoji="1" lang="ja-JP" altLang="en-US" sz="2800">
+              <a:latin typeface="Arial Unicode MS" panose="020B0604020202020204" pitchFamily="50" charset="-128"/>
+              <a:ea typeface="Arial Unicode MS" panose="020B0604020202020204" pitchFamily="50" charset="-128"/>
+              <a:cs typeface="Arial Unicode MS" panose="020B0604020202020204" pitchFamily="50" charset="-128"/>
+            </a:endParaRPr>
+          </a:p>
+        </p:txBody>
+      </p:sp>
+      <p:sp>
+        <p:nvSpPr>
+          <p:cNvPr id="126" name="角丸四角形 125"/>
+          <p:cNvSpPr/>
+          <p:nvPr/>
+        </p:nvSpPr>
+        <p:spPr>
+          <a:xfrm>
+            <a:off x="922382" y="2303196"/>
+            <a:ext cx="1296144" cy="504056"/>
+          </a:xfrm>
+          <a:prstGeom prst="roundRect">
+            <a:avLst/>
+          </a:prstGeom>
+          <a:gradFill>
+            <a:gsLst>
+              <a:gs pos="0">
+                <a:schemeClr val="accent1">
+                  <a:tint val="66000"/>
+                  <a:satMod val="160000"/>
+                </a:schemeClr>
+              </a:gs>
+              <a:gs pos="50000">
+                <a:schemeClr val="accent1">
+                  <a:tint val="44500"/>
+                  <a:satMod val="160000"/>
+                </a:schemeClr>
+              </a:gs>
+              <a:gs pos="100000">
+                <a:schemeClr val="accent1">
+                  <a:tint val="23500"/>
+                  <a:satMod val="160000"/>
+                </a:schemeClr>
+              </a:gs>
+            </a:gsLst>
+            <a:lin ang="5400000" scaled="0"/>
+          </a:gradFill>
+          <a:ln>
+            <a:noFill/>
+          </a:ln>
+        </p:spPr>
+        <p:style>
+          <a:lnRef idx="2">
+            <a:schemeClr val="accent1">
+              <a:shade val="50000"/>
+            </a:schemeClr>
+          </a:lnRef>
+          <a:fillRef idx="1">
+            <a:schemeClr val="accent1"/>
+          </a:fillRef>
+          <a:effectRef idx="0">
+            <a:schemeClr val="accent1"/>
+          </a:effectRef>
+          <a:fontRef idx="minor">
+            <a:schemeClr val="lt1"/>
+          </a:fontRef>
+        </p:style>
+        <p:txBody>
+          <a:bodyPr rtlCol="0" anchor="ctr"/>
+          <a:lstStyle/>
+          <a:p>
+            <a:pPr algn="ctr"/>
+            <a:r>
+              <a:rPr kumimoji="1" lang="en-US" altLang="ja-JP" smtClean="0">
                 <a:solidFill>
                   <a:schemeClr val="tx1"/>
                 </a:solidFill>
-              </a:endParaRPr>
-            </a:p>
-          </p:txBody>
-        </p:sp>
-        <p:sp>
-          <p:nvSpPr>
-            <p:cNvPr id="127" name="角丸四角形 126"/>
-            <p:cNvSpPr/>
-            <p:nvPr/>
-          </p:nvSpPr>
-          <p:spPr>
-            <a:xfrm>
-              <a:off x="915621" y="1035127"/>
-              <a:ext cx="1296144" cy="504056"/>
-            </a:xfrm>
-            <a:prstGeom prst="roundRect">
-              <a:avLst/>
-            </a:prstGeom>
-            <a:gradFill>
-              <a:gsLst>
-                <a:gs pos="0">
-                  <a:schemeClr val="accent1">
-                    <a:tint val="66000"/>
-                    <a:satMod val="160000"/>
-                  </a:schemeClr>
-                </a:gs>
-                <a:gs pos="50000">
-                  <a:schemeClr val="accent1">
-                    <a:tint val="44500"/>
-                    <a:satMod val="160000"/>
-                  </a:schemeClr>
-                </a:gs>
-                <a:gs pos="100000">
-                  <a:schemeClr val="accent1">
-                    <a:tint val="23500"/>
-                    <a:satMod val="160000"/>
-                  </a:schemeClr>
-                </a:gs>
-              </a:gsLst>
-              <a:lin ang="5400000" scaled="0"/>
-            </a:gradFill>
-            <a:ln>
-              <a:noFill/>
-            </a:ln>
-          </p:spPr>
-          <p:style>
-            <a:lnRef idx="2">
-              <a:schemeClr val="accent1">
-                <a:shade val="50000"/>
-              </a:schemeClr>
-            </a:lnRef>
-            <a:fillRef idx="1">
-              <a:schemeClr val="accent1"/>
-            </a:fillRef>
-            <a:effectRef idx="0">
-              <a:schemeClr val="accent1"/>
-            </a:effectRef>
-            <a:fontRef idx="minor">
-              <a:schemeClr val="lt1"/>
-            </a:fontRef>
-          </p:style>
-          <p:txBody>
-            <a:bodyPr rtlCol="0" anchor="ctr"/>
-            <a:lstStyle/>
-            <a:p>
-              <a:pPr algn="ctr"/>
-              <a:r>
-                <a:rPr kumimoji="1" lang="en-US" altLang="ja-JP" smtClean="0">
-                  <a:solidFill>
-                    <a:schemeClr val="tx1"/>
-                  </a:solidFill>
-                </a:rPr>
-                <a:t>Clear</a:t>
-              </a:r>
-              <a:endParaRPr kumimoji="1" lang="ja-JP" altLang="en-US">
+              </a:rPr>
+              <a:t>SyncReady</a:t>
+            </a:r>
+            <a:endParaRPr kumimoji="1" lang="ja-JP" altLang="en-US">
+              <a:solidFill>
+                <a:schemeClr val="tx1"/>
+              </a:solidFill>
+            </a:endParaRPr>
+          </a:p>
+        </p:txBody>
+      </p:sp>
+      <p:sp>
+        <p:nvSpPr>
+          <p:cNvPr id="127" name="角丸四角形 126"/>
+          <p:cNvSpPr/>
+          <p:nvPr/>
+        </p:nvSpPr>
+        <p:spPr>
+          <a:xfrm>
+            <a:off x="922382" y="1255989"/>
+            <a:ext cx="1296144" cy="504056"/>
+          </a:xfrm>
+          <a:prstGeom prst="roundRect">
+            <a:avLst/>
+          </a:prstGeom>
+          <a:gradFill>
+            <a:gsLst>
+              <a:gs pos="0">
+                <a:schemeClr val="accent1">
+                  <a:tint val="66000"/>
+                  <a:satMod val="160000"/>
+                </a:schemeClr>
+              </a:gs>
+              <a:gs pos="50000">
+                <a:schemeClr val="accent1">
+                  <a:tint val="44500"/>
+                  <a:satMod val="160000"/>
+                </a:schemeClr>
+              </a:gs>
+              <a:gs pos="100000">
+                <a:schemeClr val="accent1">
+                  <a:tint val="23500"/>
+                  <a:satMod val="160000"/>
+                </a:schemeClr>
+              </a:gs>
+            </a:gsLst>
+            <a:lin ang="5400000" scaled="0"/>
+          </a:gradFill>
+          <a:ln>
+            <a:noFill/>
+          </a:ln>
+        </p:spPr>
+        <p:style>
+          <a:lnRef idx="2">
+            <a:schemeClr val="accent1">
+              <a:shade val="50000"/>
+            </a:schemeClr>
+          </a:lnRef>
+          <a:fillRef idx="1">
+            <a:schemeClr val="accent1"/>
+          </a:fillRef>
+          <a:effectRef idx="0">
+            <a:schemeClr val="accent1"/>
+          </a:effectRef>
+          <a:fontRef idx="minor">
+            <a:schemeClr val="lt1"/>
+          </a:fontRef>
+        </p:style>
+        <p:txBody>
+          <a:bodyPr rtlCol="0" anchor="ctr"/>
+          <a:lstStyle/>
+          <a:p>
+            <a:pPr algn="ctr"/>
+            <a:r>
+              <a:rPr kumimoji="1" lang="en-US" altLang="ja-JP" smtClean="0">
                 <a:solidFill>
                   <a:schemeClr val="tx1"/>
                 </a:solidFill>
-              </a:endParaRPr>
-            </a:p>
-          </p:txBody>
-        </p:sp>
-        <p:cxnSp>
-          <p:nvCxnSpPr>
-            <p:cNvPr id="128" name="直線矢印コネクタ 127"/>
-            <p:cNvCxnSpPr/>
-            <p:nvPr/>
-          </p:nvCxnSpPr>
-          <p:spPr>
-            <a:xfrm flipV="1">
-              <a:off x="1915151" y="1539184"/>
-              <a:ext cx="0" cy="543150"/>
-            </a:xfrm>
-            <a:prstGeom prst="straightConnector1">
-              <a:avLst/>
-            </a:prstGeom>
-            <a:ln>
+              </a:rPr>
+              <a:t>Clear</a:t>
+            </a:r>
+            <a:endParaRPr kumimoji="1" lang="ja-JP" altLang="en-US">
               <a:solidFill>
                 <a:schemeClr val="tx1"/>
               </a:solidFill>
-              <a:tailEnd type="arrow"/>
-            </a:ln>
-          </p:spPr>
-          <p:style>
-            <a:lnRef idx="1">
-              <a:schemeClr val="accent1"/>
-            </a:lnRef>
-            <a:fillRef idx="0">
-              <a:schemeClr val="accent1"/>
-            </a:fillRef>
-            <a:effectRef idx="0">
-              <a:schemeClr val="accent1"/>
-            </a:effectRef>
-            <a:fontRef idx="minor">
+            </a:endParaRPr>
+          </a:p>
+        </p:txBody>
+      </p:sp>
+      <p:cxnSp>
+        <p:nvCxnSpPr>
+          <p:cNvPr id="128" name="直線矢印コネクタ 127"/>
+          <p:cNvCxnSpPr/>
+          <p:nvPr/>
+        </p:nvCxnSpPr>
+        <p:spPr>
+          <a:xfrm flipV="1">
+            <a:off x="1921912" y="1760046"/>
+            <a:ext cx="0" cy="543150"/>
+          </a:xfrm>
+          <a:prstGeom prst="straightConnector1">
+            <a:avLst/>
+          </a:prstGeom>
+          <a:ln>
+            <a:solidFill>
               <a:schemeClr val="tx1"/>
-            </a:fontRef>
-          </p:style>
-        </p:cxnSp>
-        <p:cxnSp>
-          <p:nvCxnSpPr>
-            <p:cNvPr id="129" name="直線矢印コネクタ 128"/>
-            <p:cNvCxnSpPr/>
-            <p:nvPr/>
-          </p:nvCxnSpPr>
-          <p:spPr>
-            <a:xfrm>
-              <a:off x="1166228" y="1539183"/>
-              <a:ext cx="1" cy="543151"/>
-            </a:xfrm>
-            <a:prstGeom prst="straightConnector1">
-              <a:avLst/>
-            </a:prstGeom>
-            <a:ln>
+            </a:solidFill>
+            <a:tailEnd type="arrow"/>
+          </a:ln>
+        </p:spPr>
+        <p:style>
+          <a:lnRef idx="1">
+            <a:schemeClr val="accent1"/>
+          </a:lnRef>
+          <a:fillRef idx="0">
+            <a:schemeClr val="accent1"/>
+          </a:fillRef>
+          <a:effectRef idx="0">
+            <a:schemeClr val="accent1"/>
+          </a:effectRef>
+          <a:fontRef idx="minor">
+            <a:schemeClr val="tx1"/>
+          </a:fontRef>
+        </p:style>
+      </p:cxnSp>
+      <p:cxnSp>
+        <p:nvCxnSpPr>
+          <p:cNvPr id="129" name="直線矢印コネクタ 128"/>
+          <p:cNvCxnSpPr/>
+          <p:nvPr/>
+        </p:nvCxnSpPr>
+        <p:spPr>
+          <a:xfrm>
+            <a:off x="1172989" y="1760045"/>
+            <a:ext cx="1" cy="543151"/>
+          </a:xfrm>
+          <a:prstGeom prst="straightConnector1">
+            <a:avLst/>
+          </a:prstGeom>
+          <a:ln>
+            <a:solidFill>
+              <a:schemeClr val="tx1"/>
+            </a:solidFill>
+            <a:tailEnd type="arrow"/>
+          </a:ln>
+        </p:spPr>
+        <p:style>
+          <a:lnRef idx="1">
+            <a:schemeClr val="accent1"/>
+          </a:lnRef>
+          <a:fillRef idx="0">
+            <a:schemeClr val="accent1"/>
+          </a:fillRef>
+          <a:effectRef idx="0">
+            <a:schemeClr val="accent1"/>
+          </a:effectRef>
+          <a:fontRef idx="minor">
+            <a:schemeClr val="tx1"/>
+          </a:fontRef>
+        </p:style>
+      </p:cxnSp>
+      <p:sp>
+        <p:nvSpPr>
+          <p:cNvPr id="130" name="テキスト ボックス 129"/>
+          <p:cNvSpPr txBox="1"/>
+          <p:nvPr/>
+        </p:nvSpPr>
+        <p:spPr>
+          <a:xfrm>
+            <a:off x="1892899" y="1772816"/>
+            <a:ext cx="878901" cy="338554"/>
+          </a:xfrm>
+          <a:prstGeom prst="rect">
+            <a:avLst/>
+          </a:prstGeom>
+          <a:noFill/>
+        </p:spPr>
+        <p:txBody>
+          <a:bodyPr wrap="square" rtlCol="0">
+            <a:spAutoFit/>
+          </a:bodyPr>
+          <a:lstStyle/>
+          <a:p>
+            <a:r>
+              <a:rPr kumimoji="1" lang="en-US" altLang="ja-JP" sz="1600" smtClean="0">
+                <a:latin typeface="Gungsuh" panose="02030600000101010101" pitchFamily="18" charset="-127"/>
+                <a:ea typeface="Gungsuh" panose="02030600000101010101" pitchFamily="18" charset="-127"/>
+              </a:rPr>
+              <a:t>clear</a:t>
+            </a:r>
+            <a:endParaRPr kumimoji="1" lang="ja-JP" altLang="en-US" sz="1600">
+              <a:latin typeface="Gungsuh" panose="02030600000101010101" pitchFamily="18" charset="-127"/>
+              <a:ea typeface="Gungsuh" panose="02030600000101010101" pitchFamily="18" charset="-127"/>
+            </a:endParaRPr>
+          </a:p>
+        </p:txBody>
+      </p:sp>
+      <p:sp>
+        <p:nvSpPr>
+          <p:cNvPr id="131" name="テキスト ボックス 130"/>
+          <p:cNvSpPr txBox="1"/>
+          <p:nvPr/>
+        </p:nvSpPr>
+        <p:spPr>
+          <a:xfrm>
+            <a:off x="510531" y="1772816"/>
+            <a:ext cx="677093" cy="338554"/>
+          </a:xfrm>
+          <a:prstGeom prst="rect">
+            <a:avLst/>
+          </a:prstGeom>
+          <a:noFill/>
+        </p:spPr>
+        <p:txBody>
+          <a:bodyPr wrap="square" rtlCol="0">
+            <a:spAutoFit/>
+          </a:bodyPr>
+          <a:lstStyle/>
+          <a:p>
+            <a:r>
+              <a:rPr lang="en-US" altLang="ja-JP" sz="1600" smtClean="0">
+                <a:latin typeface="Gungsuh" panose="02030600000101010101" pitchFamily="18" charset="-127"/>
+                <a:ea typeface="Gungsuh" panose="02030600000101010101" pitchFamily="18" charset="-127"/>
+              </a:rPr>
+              <a:t>init</a:t>
+            </a:r>
+            <a:endParaRPr kumimoji="1" lang="ja-JP" altLang="en-US" sz="1600">
+              <a:latin typeface="Gungsuh" panose="02030600000101010101" pitchFamily="18" charset="-127"/>
+              <a:ea typeface="Gungsuh" panose="02030600000101010101" pitchFamily="18" charset="-127"/>
+            </a:endParaRPr>
+          </a:p>
+        </p:txBody>
+      </p:sp>
+      <p:cxnSp>
+        <p:nvCxnSpPr>
+          <p:cNvPr id="132" name="直線矢印コネクタ 131"/>
+          <p:cNvCxnSpPr>
+            <a:stCxn id="126" idx="2"/>
+          </p:cNvCxnSpPr>
+          <p:nvPr/>
+        </p:nvCxnSpPr>
+        <p:spPr>
+          <a:xfrm>
+            <a:off x="1570454" y="2807252"/>
+            <a:ext cx="0" cy="1160839"/>
+          </a:xfrm>
+          <a:prstGeom prst="straightConnector1">
+            <a:avLst/>
+          </a:prstGeom>
+          <a:ln>
+            <a:solidFill>
+              <a:schemeClr val="tx1"/>
+            </a:solidFill>
+            <a:tailEnd type="arrow"/>
+          </a:ln>
+        </p:spPr>
+        <p:style>
+          <a:lnRef idx="1">
+            <a:schemeClr val="accent1"/>
+          </a:lnRef>
+          <a:fillRef idx="0">
+            <a:schemeClr val="accent1"/>
+          </a:fillRef>
+          <a:effectRef idx="0">
+            <a:schemeClr val="accent1"/>
+          </a:effectRef>
+          <a:fontRef idx="minor">
+            <a:schemeClr val="tx1"/>
+          </a:fontRef>
+        </p:style>
+      </p:cxnSp>
+      <p:sp>
+        <p:nvSpPr>
+          <p:cNvPr id="133" name="角丸四角形 132"/>
+          <p:cNvSpPr/>
+          <p:nvPr/>
+        </p:nvSpPr>
+        <p:spPr>
+          <a:xfrm>
+            <a:off x="683568" y="3145806"/>
+            <a:ext cx="1728192" cy="504056"/>
+          </a:xfrm>
+          <a:prstGeom prst="roundRect">
+            <a:avLst/>
+          </a:prstGeom>
+          <a:gradFill>
+            <a:gsLst>
+              <a:gs pos="0">
+                <a:schemeClr val="accent2">
+                  <a:lumMod val="60000"/>
+                  <a:lumOff val="40000"/>
+                </a:schemeClr>
+              </a:gs>
+              <a:gs pos="100000">
+                <a:schemeClr val="accent6">
+                  <a:lumMod val="20000"/>
+                  <a:lumOff val="80000"/>
+                </a:schemeClr>
+              </a:gs>
+            </a:gsLst>
+            <a:lin ang="5400000" scaled="0"/>
+          </a:gradFill>
+          <a:ln>
+            <a:noFill/>
+          </a:ln>
+        </p:spPr>
+        <p:style>
+          <a:lnRef idx="2">
+            <a:schemeClr val="accent1">
+              <a:shade val="50000"/>
+            </a:schemeClr>
+          </a:lnRef>
+          <a:fillRef idx="1">
+            <a:schemeClr val="accent1"/>
+          </a:fillRef>
+          <a:effectRef idx="0">
+            <a:schemeClr val="accent1"/>
+          </a:effectRef>
+          <a:fontRef idx="minor">
+            <a:schemeClr val="lt1"/>
+          </a:fontRef>
+        </p:style>
+        <p:txBody>
+          <a:bodyPr rtlCol="0" anchor="ctr"/>
+          <a:lstStyle/>
+          <a:p>
+            <a:pPr algn="ctr"/>
+            <a:r>
+              <a:rPr lang="en-US" altLang="ja-JP" smtClean="0">
+                <a:solidFill>
+                  <a:schemeClr val="tx1"/>
+                </a:solidFill>
+              </a:rPr>
+              <a:t>F</a:t>
+            </a:r>
+            <a:r>
+              <a:rPr kumimoji="1" lang="en-US" altLang="ja-JP" smtClean="0">
+                <a:solidFill>
+                  <a:schemeClr val="tx1"/>
+                </a:solidFill>
+              </a:rPr>
+              <a:t>ull/Hash sync</a:t>
+            </a:r>
+            <a:endParaRPr kumimoji="1" lang="ja-JP" altLang="en-US">
               <a:solidFill>
                 <a:schemeClr val="tx1"/>
               </a:solidFill>
-              <a:tailEnd type="arrow"/>
-            </a:ln>
-          </p:spPr>
-          <p:style>
-            <a:lnRef idx="1">
-              <a:schemeClr val="accent1"/>
-            </a:lnRef>
-            <a:fillRef idx="0">
-              <a:schemeClr val="accent1"/>
-            </a:fillRef>
-            <a:effectRef idx="0">
-              <a:schemeClr val="accent1"/>
-            </a:effectRef>
-            <a:fontRef idx="minor">
-              <a:schemeClr val="tx1"/>
-            </a:fontRef>
-          </p:style>
-        </p:cxnSp>
-        <p:sp>
-          <p:nvSpPr>
-            <p:cNvPr id="130" name="テキスト ボックス 129"/>
-            <p:cNvSpPr txBox="1"/>
-            <p:nvPr/>
-          </p:nvSpPr>
-          <p:spPr>
-            <a:xfrm>
-              <a:off x="1886138" y="1645448"/>
-              <a:ext cx="878901" cy="338554"/>
-            </a:xfrm>
-            <a:prstGeom prst="rect">
-              <a:avLst/>
-            </a:prstGeom>
-            <a:noFill/>
-          </p:spPr>
-          <p:txBody>
-            <a:bodyPr wrap="square" rtlCol="0">
-              <a:spAutoFit/>
-            </a:bodyPr>
-            <a:lstStyle/>
-            <a:p>
-              <a:r>
-                <a:rPr kumimoji="1" lang="en-US" altLang="ja-JP" sz="1600" smtClean="0">
-                  <a:latin typeface="Gungsuh" panose="02030600000101010101" pitchFamily="18" charset="-127"/>
-                  <a:ea typeface="Gungsuh" panose="02030600000101010101" pitchFamily="18" charset="-127"/>
-                </a:rPr>
-                <a:t>clear</a:t>
-              </a:r>
-              <a:endParaRPr kumimoji="1" lang="ja-JP" altLang="en-US" sz="1600">
+            </a:endParaRPr>
+          </a:p>
+        </p:txBody>
+      </p:sp>
+      <p:sp>
+        <p:nvSpPr>
+          <p:cNvPr id="134" name="テキスト ボックス 133"/>
+          <p:cNvSpPr txBox="1"/>
+          <p:nvPr/>
+        </p:nvSpPr>
+        <p:spPr>
+          <a:xfrm>
+            <a:off x="611560" y="2802414"/>
+            <a:ext cx="1152128" cy="338554"/>
+          </a:xfrm>
+          <a:prstGeom prst="rect">
+            <a:avLst/>
+          </a:prstGeom>
+          <a:noFill/>
+        </p:spPr>
+        <p:txBody>
+          <a:bodyPr wrap="square" rtlCol="0">
+            <a:spAutoFit/>
+          </a:bodyPr>
+          <a:lstStyle/>
+          <a:p>
+            <a:r>
+              <a:rPr kumimoji="1" lang="en-US" altLang="ja-JP" sz="1600" smtClean="0">
                 <a:latin typeface="Gungsuh" panose="02030600000101010101" pitchFamily="18" charset="-127"/>
                 <a:ea typeface="Gungsuh" panose="02030600000101010101" pitchFamily="18" charset="-127"/>
-              </a:endParaRPr>
-            </a:p>
-          </p:txBody>
-        </p:sp>
-        <p:sp>
-          <p:nvSpPr>
-            <p:cNvPr id="131" name="テキスト ボックス 130"/>
-            <p:cNvSpPr txBox="1"/>
-            <p:nvPr/>
-          </p:nvSpPr>
-          <p:spPr>
-            <a:xfrm>
-              <a:off x="503770" y="1630971"/>
-              <a:ext cx="677093" cy="338554"/>
-            </a:xfrm>
-            <a:prstGeom prst="rect">
-              <a:avLst/>
-            </a:prstGeom>
-            <a:noFill/>
-          </p:spPr>
-          <p:txBody>
-            <a:bodyPr wrap="square" rtlCol="0">
-              <a:spAutoFit/>
-            </a:bodyPr>
-            <a:lstStyle/>
-            <a:p>
-              <a:r>
-                <a:rPr lang="en-US" altLang="ja-JP" sz="1600" smtClean="0">
-                  <a:latin typeface="Gungsuh" panose="02030600000101010101" pitchFamily="18" charset="-127"/>
-                  <a:ea typeface="Gungsuh" panose="02030600000101010101" pitchFamily="18" charset="-127"/>
-                </a:rPr>
-                <a:t>init</a:t>
-              </a:r>
-              <a:endParaRPr kumimoji="1" lang="ja-JP" altLang="en-US" sz="1600">
+              </a:rPr>
+              <a:t>backup</a:t>
+            </a:r>
+            <a:endParaRPr kumimoji="1" lang="ja-JP" altLang="en-US" sz="1600">
+              <a:latin typeface="Gungsuh" panose="02030600000101010101" pitchFamily="18" charset="-127"/>
+              <a:ea typeface="Gungsuh" panose="02030600000101010101" pitchFamily="18" charset="-127"/>
+            </a:endParaRPr>
+          </a:p>
+        </p:txBody>
+      </p:sp>
+      <p:sp>
+        <p:nvSpPr>
+          <p:cNvPr id="136" name="テキスト ボックス 135"/>
+          <p:cNvSpPr txBox="1"/>
+          <p:nvPr/>
+        </p:nvSpPr>
+        <p:spPr>
+          <a:xfrm>
+            <a:off x="516515" y="4602614"/>
+            <a:ext cx="815125" cy="338554"/>
+          </a:xfrm>
+          <a:prstGeom prst="rect">
+            <a:avLst/>
+          </a:prstGeom>
+          <a:noFill/>
+        </p:spPr>
+        <p:txBody>
+          <a:bodyPr wrap="square" rtlCol="0">
+            <a:spAutoFit/>
+          </a:bodyPr>
+          <a:lstStyle/>
+          <a:p>
+            <a:r>
+              <a:rPr kumimoji="1" lang="en-US" altLang="ja-JP" sz="1600" smtClean="0">
                 <a:latin typeface="Gungsuh" panose="02030600000101010101" pitchFamily="18" charset="-127"/>
                 <a:ea typeface="Gungsuh" panose="02030600000101010101" pitchFamily="18" charset="-127"/>
-              </a:endParaRPr>
-            </a:p>
-          </p:txBody>
-        </p:sp>
-        <p:cxnSp>
-          <p:nvCxnSpPr>
-            <p:cNvPr id="132" name="直線矢印コネクタ 131"/>
-            <p:cNvCxnSpPr/>
-            <p:nvPr/>
-          </p:nvCxnSpPr>
-          <p:spPr>
-            <a:xfrm>
-              <a:off x="2195832" y="2334362"/>
-              <a:ext cx="1788894" cy="5424"/>
-            </a:xfrm>
-            <a:prstGeom prst="straightConnector1">
-              <a:avLst/>
-            </a:prstGeom>
-            <a:ln>
-              <a:solidFill>
-                <a:schemeClr val="tx1"/>
-              </a:solidFill>
-              <a:tailEnd type="arrow"/>
-            </a:ln>
-          </p:spPr>
-          <p:style>
-            <a:lnRef idx="1">
-              <a:schemeClr val="accent1"/>
-            </a:lnRef>
-            <a:fillRef idx="0">
-              <a:schemeClr val="accent1"/>
-            </a:fillRef>
-            <a:effectRef idx="0">
-              <a:schemeClr val="accent1"/>
-            </a:effectRef>
-            <a:fontRef idx="minor">
+              </a:rPr>
+              <a:t>start</a:t>
+            </a:r>
+            <a:endParaRPr kumimoji="1" lang="ja-JP" altLang="en-US" sz="1600">
+              <a:latin typeface="Gungsuh" panose="02030600000101010101" pitchFamily="18" charset="-127"/>
+              <a:ea typeface="Gungsuh" panose="02030600000101010101" pitchFamily="18" charset="-127"/>
+            </a:endParaRPr>
+          </a:p>
+        </p:txBody>
+      </p:sp>
+      <p:cxnSp>
+        <p:nvCxnSpPr>
+          <p:cNvPr id="137" name="直線矢印コネクタ 136"/>
+          <p:cNvCxnSpPr/>
+          <p:nvPr/>
+        </p:nvCxnSpPr>
+        <p:spPr>
+          <a:xfrm>
+            <a:off x="1331640" y="4455941"/>
+            <a:ext cx="0" cy="623390"/>
+          </a:xfrm>
+          <a:prstGeom prst="straightConnector1">
+            <a:avLst/>
+          </a:prstGeom>
+          <a:ln>
+            <a:solidFill>
               <a:schemeClr val="tx1"/>
-            </a:fontRef>
-          </p:style>
-        </p:cxnSp>
-        <p:sp>
-          <p:nvSpPr>
-            <p:cNvPr id="133" name="角丸四角形 132"/>
-            <p:cNvSpPr/>
-            <p:nvPr/>
-          </p:nvSpPr>
-          <p:spPr>
-            <a:xfrm>
-              <a:off x="2528013" y="2113193"/>
-              <a:ext cx="1140892" cy="504056"/>
-            </a:xfrm>
-            <a:prstGeom prst="roundRect">
-              <a:avLst/>
-            </a:prstGeom>
-            <a:gradFill>
-              <a:gsLst>
-                <a:gs pos="0">
-                  <a:schemeClr val="accent2">
-                    <a:lumMod val="60000"/>
-                    <a:lumOff val="40000"/>
-                  </a:schemeClr>
-                </a:gs>
-                <a:gs pos="100000">
-                  <a:schemeClr val="accent6">
-                    <a:lumMod val="20000"/>
-                    <a:lumOff val="80000"/>
-                  </a:schemeClr>
-                </a:gs>
-              </a:gsLst>
-              <a:lin ang="5400000" scaled="0"/>
-            </a:gradFill>
-            <a:ln>
-              <a:noFill/>
-            </a:ln>
-          </p:spPr>
-          <p:style>
-            <a:lnRef idx="2">
-              <a:schemeClr val="accent1">
-                <a:shade val="50000"/>
-              </a:schemeClr>
-            </a:lnRef>
-            <a:fillRef idx="1">
-              <a:schemeClr val="accent1"/>
-            </a:fillRef>
-            <a:effectRef idx="0">
-              <a:schemeClr val="accent1"/>
-            </a:effectRef>
-            <a:fontRef idx="minor">
-              <a:schemeClr val="lt1"/>
-            </a:fontRef>
-          </p:style>
-          <p:txBody>
-            <a:bodyPr rtlCol="0" anchor="ctr"/>
-            <a:lstStyle/>
-            <a:p>
-              <a:pPr algn="ctr"/>
-              <a:r>
-                <a:rPr lang="en-US" altLang="ja-JP" smtClean="0">
-                  <a:solidFill>
-                    <a:schemeClr val="tx1"/>
-                  </a:solidFill>
-                </a:rPr>
-                <a:t>F</a:t>
-              </a:r>
-              <a:r>
-                <a:rPr kumimoji="1" lang="en-US" altLang="ja-JP" smtClean="0">
-                  <a:solidFill>
-                    <a:schemeClr val="tx1"/>
-                  </a:solidFill>
-                </a:rPr>
-                <a:t>ull/Hash sync</a:t>
-              </a:r>
-              <a:endParaRPr kumimoji="1" lang="ja-JP" altLang="en-US">
-                <a:solidFill>
-                  <a:schemeClr val="tx1"/>
-                </a:solidFill>
-              </a:endParaRPr>
-            </a:p>
-          </p:txBody>
-        </p:sp>
-        <p:sp>
-          <p:nvSpPr>
-            <p:cNvPr id="134" name="テキスト ボックス 133"/>
-            <p:cNvSpPr txBox="1"/>
-            <p:nvPr/>
-          </p:nvSpPr>
-          <p:spPr>
-            <a:xfrm>
-              <a:off x="2624523" y="2586390"/>
-              <a:ext cx="1152128" cy="338554"/>
-            </a:xfrm>
-            <a:prstGeom prst="rect">
-              <a:avLst/>
-            </a:prstGeom>
-            <a:noFill/>
-          </p:spPr>
-          <p:txBody>
-            <a:bodyPr wrap="square" rtlCol="0">
-              <a:spAutoFit/>
-            </a:bodyPr>
-            <a:lstStyle/>
-            <a:p>
-              <a:r>
-                <a:rPr kumimoji="1" lang="en-US" altLang="ja-JP" sz="1600" smtClean="0">
-                  <a:latin typeface="Gungsuh" panose="02030600000101010101" pitchFamily="18" charset="-127"/>
-                  <a:ea typeface="Gungsuh" panose="02030600000101010101" pitchFamily="18" charset="-127"/>
-                </a:rPr>
-                <a:t>backup</a:t>
-              </a:r>
-              <a:endParaRPr kumimoji="1" lang="ja-JP" altLang="en-US" sz="1600">
+            </a:solidFill>
+            <a:tailEnd type="arrow"/>
+          </a:ln>
+        </p:spPr>
+        <p:style>
+          <a:lnRef idx="1">
+            <a:schemeClr val="accent1"/>
+          </a:lnRef>
+          <a:fillRef idx="0">
+            <a:schemeClr val="accent1"/>
+          </a:fillRef>
+          <a:effectRef idx="0">
+            <a:schemeClr val="accent1"/>
+          </a:effectRef>
+          <a:fontRef idx="minor">
+            <a:schemeClr val="tx1"/>
+          </a:fontRef>
+        </p:style>
+      </p:cxnSp>
+      <p:sp>
+        <p:nvSpPr>
+          <p:cNvPr id="138" name="テキスト ボックス 137"/>
+          <p:cNvSpPr txBox="1"/>
+          <p:nvPr/>
+        </p:nvSpPr>
+        <p:spPr>
+          <a:xfrm>
+            <a:off x="1820435" y="4582693"/>
+            <a:ext cx="815125" cy="338554"/>
+          </a:xfrm>
+          <a:prstGeom prst="rect">
+            <a:avLst/>
+          </a:prstGeom>
+          <a:noFill/>
+        </p:spPr>
+        <p:txBody>
+          <a:bodyPr wrap="square" rtlCol="0">
+            <a:spAutoFit/>
+          </a:bodyPr>
+          <a:lstStyle/>
+          <a:p>
+            <a:r>
+              <a:rPr kumimoji="1" lang="en-US" altLang="ja-JP" sz="1600" smtClean="0">
                 <a:latin typeface="Gungsuh" panose="02030600000101010101" pitchFamily="18" charset="-127"/>
                 <a:ea typeface="Gungsuh" panose="02030600000101010101" pitchFamily="18" charset="-127"/>
-              </a:endParaRPr>
-            </a:p>
-          </p:txBody>
-        </p:sp>
-        <p:cxnSp>
-          <p:nvCxnSpPr>
-            <p:cNvPr id="135" name="直線矢印コネクタ 134"/>
-            <p:cNvCxnSpPr/>
-            <p:nvPr/>
-          </p:nvCxnSpPr>
-          <p:spPr>
-            <a:xfrm flipH="1">
-              <a:off x="3126001" y="2595101"/>
-              <a:ext cx="1554715" cy="1152128"/>
-            </a:xfrm>
-            <a:prstGeom prst="straightConnector1">
-              <a:avLst/>
-            </a:prstGeom>
-            <a:ln>
-              <a:solidFill>
-                <a:schemeClr val="tx1"/>
-              </a:solidFill>
-              <a:tailEnd type="arrow"/>
-            </a:ln>
-          </p:spPr>
-          <p:style>
-            <a:lnRef idx="1">
-              <a:schemeClr val="accent1"/>
-            </a:lnRef>
-            <a:fillRef idx="0">
-              <a:schemeClr val="accent1"/>
-            </a:fillRef>
-            <a:effectRef idx="0">
-              <a:schemeClr val="accent1"/>
-            </a:effectRef>
-            <a:fontRef idx="minor">
-              <a:schemeClr val="tx1"/>
-            </a:fontRef>
-          </p:style>
-        </p:cxnSp>
-        <p:sp>
-          <p:nvSpPr>
-            <p:cNvPr id="136" name="テキスト ボックス 135"/>
-            <p:cNvSpPr txBox="1"/>
-            <p:nvPr/>
-          </p:nvSpPr>
-          <p:spPr>
-            <a:xfrm>
-              <a:off x="3903359" y="3001888"/>
-              <a:ext cx="815125" cy="338554"/>
-            </a:xfrm>
-            <a:prstGeom prst="rect">
-              <a:avLst/>
-            </a:prstGeom>
-            <a:noFill/>
-          </p:spPr>
-          <p:txBody>
-            <a:bodyPr wrap="square" rtlCol="0">
-              <a:spAutoFit/>
-            </a:bodyPr>
-            <a:lstStyle/>
-            <a:p>
-              <a:r>
-                <a:rPr kumimoji="1" lang="en-US" altLang="ja-JP" sz="1600" smtClean="0">
-                  <a:latin typeface="Gungsuh" panose="02030600000101010101" pitchFamily="18" charset="-127"/>
-                  <a:ea typeface="Gungsuh" panose="02030600000101010101" pitchFamily="18" charset="-127"/>
-                </a:rPr>
-                <a:t>start</a:t>
-              </a:r>
-              <a:endParaRPr kumimoji="1" lang="ja-JP" altLang="en-US" sz="1600">
+              </a:rPr>
+              <a:t>stop</a:t>
+            </a:r>
+            <a:endParaRPr kumimoji="1" lang="ja-JP" altLang="en-US" sz="1600">
+              <a:latin typeface="Gungsuh" panose="02030600000101010101" pitchFamily="18" charset="-127"/>
+              <a:ea typeface="Gungsuh" panose="02030600000101010101" pitchFamily="18" charset="-127"/>
+            </a:endParaRPr>
+          </a:p>
+        </p:txBody>
+      </p:sp>
+      <p:sp>
+        <p:nvSpPr>
+          <p:cNvPr id="145" name="テキスト ボックス 144"/>
+          <p:cNvSpPr txBox="1"/>
+          <p:nvPr/>
+        </p:nvSpPr>
+        <p:spPr>
+          <a:xfrm>
+            <a:off x="2578006" y="3278115"/>
+            <a:ext cx="898839" cy="338554"/>
+          </a:xfrm>
+          <a:prstGeom prst="rect">
+            <a:avLst/>
+          </a:prstGeom>
+          <a:noFill/>
+        </p:spPr>
+        <p:txBody>
+          <a:bodyPr wrap="square" rtlCol="0">
+            <a:spAutoFit/>
+          </a:bodyPr>
+          <a:lstStyle/>
+          <a:p>
+            <a:r>
+              <a:rPr kumimoji="1" lang="en-US" altLang="ja-JP" sz="1600" smtClean="0">
                 <a:latin typeface="Gungsuh" panose="02030600000101010101" pitchFamily="18" charset="-127"/>
                 <a:ea typeface="Gungsuh" panose="02030600000101010101" pitchFamily="18" charset="-127"/>
-              </a:endParaRPr>
-            </a:p>
-          </p:txBody>
-        </p:sp>
-        <p:cxnSp>
-          <p:nvCxnSpPr>
-            <p:cNvPr id="137" name="直線矢印コネクタ 136"/>
-            <p:cNvCxnSpPr/>
-            <p:nvPr/>
-          </p:nvCxnSpPr>
-          <p:spPr>
-            <a:xfrm flipV="1">
-              <a:off x="3097390" y="2589843"/>
-              <a:ext cx="1276040" cy="930506"/>
-            </a:xfrm>
-            <a:prstGeom prst="straightConnector1">
-              <a:avLst/>
-            </a:prstGeom>
-            <a:ln>
-              <a:solidFill>
-                <a:schemeClr val="tx1"/>
-              </a:solidFill>
-              <a:tailEnd type="arrow"/>
-            </a:ln>
-          </p:spPr>
-          <p:style>
-            <a:lnRef idx="1">
-              <a:schemeClr val="accent1"/>
-            </a:lnRef>
-            <a:fillRef idx="0">
-              <a:schemeClr val="accent1"/>
-            </a:fillRef>
-            <a:effectRef idx="0">
-              <a:schemeClr val="accent1"/>
-            </a:effectRef>
-            <a:fontRef idx="minor">
+              </a:rPr>
+              <a:t>reset</a:t>
+            </a:r>
+            <a:endParaRPr kumimoji="1" lang="ja-JP" altLang="en-US" sz="1600">
+              <a:latin typeface="Gungsuh" panose="02030600000101010101" pitchFamily="18" charset="-127"/>
+              <a:ea typeface="Gungsuh" panose="02030600000101010101" pitchFamily="18" charset="-127"/>
+            </a:endParaRPr>
+          </a:p>
+        </p:txBody>
+      </p:sp>
+      <p:sp>
+        <p:nvSpPr>
+          <p:cNvPr id="146" name="円弧 145"/>
+          <p:cNvSpPr/>
+          <p:nvPr/>
+        </p:nvSpPr>
+        <p:spPr>
+          <a:xfrm rot="5400000" flipH="1">
+            <a:off x="1456809" y="3098922"/>
+            <a:ext cx="1545454" cy="696940"/>
+          </a:xfrm>
+          <a:prstGeom prst="arc">
+            <a:avLst>
+              <a:gd name="adj1" fmla="val 10713038"/>
+              <a:gd name="adj2" fmla="val 0"/>
+            </a:avLst>
+          </a:prstGeom>
+          <a:noFill/>
+          <a:ln>
+            <a:solidFill>
               <a:schemeClr val="tx1"/>
-            </a:fontRef>
-          </p:style>
-        </p:cxnSp>
-        <p:sp>
-          <p:nvSpPr>
-            <p:cNvPr id="138" name="テキスト ボックス 137"/>
-            <p:cNvSpPr txBox="1"/>
-            <p:nvPr/>
-          </p:nvSpPr>
-          <p:spPr>
-            <a:xfrm>
-              <a:off x="2920285" y="2924944"/>
-              <a:ext cx="815125" cy="338554"/>
-            </a:xfrm>
-            <a:prstGeom prst="rect">
-              <a:avLst/>
-            </a:prstGeom>
-            <a:noFill/>
-          </p:spPr>
-          <p:txBody>
-            <a:bodyPr wrap="square" rtlCol="0">
-              <a:spAutoFit/>
-            </a:bodyPr>
-            <a:lstStyle/>
-            <a:p>
-              <a:r>
-                <a:rPr kumimoji="1" lang="en-US" altLang="ja-JP" sz="1600" smtClean="0">
-                  <a:latin typeface="Gungsuh" panose="02030600000101010101" pitchFamily="18" charset="-127"/>
-                  <a:ea typeface="Gungsuh" panose="02030600000101010101" pitchFamily="18" charset="-127"/>
-                </a:rPr>
-                <a:t>stop</a:t>
-              </a:r>
-              <a:endParaRPr kumimoji="1" lang="ja-JP" altLang="en-US" sz="1600">
+            </a:solidFill>
+            <a:tailEnd type="arrow"/>
+          </a:ln>
+        </p:spPr>
+        <p:style>
+          <a:lnRef idx="1">
+            <a:schemeClr val="accent1"/>
+          </a:lnRef>
+          <a:fillRef idx="0">
+            <a:schemeClr val="accent1"/>
+          </a:fillRef>
+          <a:effectRef idx="0">
+            <a:schemeClr val="accent1"/>
+          </a:effectRef>
+          <a:fontRef idx="minor">
+            <a:schemeClr val="tx1"/>
+          </a:fontRef>
+        </p:style>
+        <p:txBody>
+          <a:bodyPr rtlCol="0" anchor="ctr"/>
+          <a:lstStyle/>
+          <a:p>
+            <a:pPr algn="ctr"/>
+            <a:endParaRPr kumimoji="1" lang="ja-JP" altLang="en-US"/>
+          </a:p>
+        </p:txBody>
+      </p:sp>
+      <p:sp>
+        <p:nvSpPr>
+          <p:cNvPr id="149" name="テキスト ボックス 148"/>
+          <p:cNvSpPr txBox="1"/>
+          <p:nvPr/>
+        </p:nvSpPr>
+        <p:spPr>
+          <a:xfrm>
+            <a:off x="2411760" y="2093421"/>
+            <a:ext cx="1629635" cy="338554"/>
+          </a:xfrm>
+          <a:prstGeom prst="rect">
+            <a:avLst/>
+          </a:prstGeom>
+          <a:noFill/>
+        </p:spPr>
+        <p:txBody>
+          <a:bodyPr wrap="square" rtlCol="0">
+            <a:spAutoFit/>
+          </a:bodyPr>
+          <a:lstStyle/>
+          <a:p>
+            <a:r>
+              <a:rPr lang="en-US" altLang="ja-JP" sz="1600" smtClean="0">
                 <a:latin typeface="Gungsuh" panose="02030600000101010101" pitchFamily="18" charset="-127"/>
                 <a:ea typeface="Gungsuh" panose="02030600000101010101" pitchFamily="18" charset="-127"/>
-              </a:endParaRPr>
-            </a:p>
-          </p:txBody>
-        </p:sp>
-        <p:sp>
-          <p:nvSpPr>
-            <p:cNvPr id="145" name="テキスト ボックス 144"/>
-            <p:cNvSpPr txBox="1"/>
-            <p:nvPr/>
-          </p:nvSpPr>
-          <p:spPr>
-            <a:xfrm>
-              <a:off x="3805198" y="1510412"/>
-              <a:ext cx="1486882" cy="338554"/>
-            </a:xfrm>
-            <a:prstGeom prst="rect">
-              <a:avLst/>
-            </a:prstGeom>
-            <a:noFill/>
-          </p:spPr>
-          <p:txBody>
-            <a:bodyPr wrap="square" rtlCol="0">
-              <a:spAutoFit/>
-            </a:bodyPr>
-            <a:lstStyle/>
-            <a:p>
-              <a:r>
-                <a:rPr kumimoji="1" lang="en-US" altLang="ja-JP" sz="1600" smtClean="0">
-                  <a:latin typeface="Gungsuh" panose="02030600000101010101" pitchFamily="18" charset="-127"/>
-                  <a:ea typeface="Gungsuh" panose="02030600000101010101" pitchFamily="18" charset="-127"/>
-                </a:rPr>
-                <a:t>reset</a:t>
-              </a:r>
-              <a:endParaRPr kumimoji="1" lang="ja-JP" altLang="en-US" sz="1600">
+              </a:rPr>
+              <a:t>go_standby</a:t>
+            </a:r>
+            <a:endParaRPr kumimoji="1" lang="ja-JP" altLang="en-US" sz="1600">
+              <a:latin typeface="Gungsuh" panose="02030600000101010101" pitchFamily="18" charset="-127"/>
+              <a:ea typeface="Gungsuh" panose="02030600000101010101" pitchFamily="18" charset="-127"/>
+            </a:endParaRPr>
+          </a:p>
+        </p:txBody>
+      </p:sp>
+      <p:sp>
+        <p:nvSpPr>
+          <p:cNvPr id="150" name="テキスト ボックス 149"/>
+          <p:cNvSpPr txBox="1"/>
+          <p:nvPr/>
+        </p:nvSpPr>
+        <p:spPr>
+          <a:xfrm>
+            <a:off x="3838175" y="799443"/>
+            <a:ext cx="872623" cy="338554"/>
+          </a:xfrm>
+          <a:prstGeom prst="rect">
+            <a:avLst/>
+          </a:prstGeom>
+          <a:noFill/>
+        </p:spPr>
+        <p:txBody>
+          <a:bodyPr wrap="square" rtlCol="0">
+            <a:spAutoFit/>
+          </a:bodyPr>
+          <a:lstStyle/>
+          <a:p>
+            <a:r>
+              <a:rPr lang="en-US" altLang="ja-JP" sz="1600" smtClean="0">
                 <a:latin typeface="Gungsuh" panose="02030600000101010101" pitchFamily="18" charset="-127"/>
                 <a:ea typeface="Gungsuh" panose="02030600000101010101" pitchFamily="18" charset="-127"/>
-              </a:endParaRPr>
-            </a:p>
-          </p:txBody>
-        </p:sp>
-        <p:sp>
-          <p:nvSpPr>
-            <p:cNvPr id="146" name="円弧 145"/>
-            <p:cNvSpPr/>
-            <p:nvPr/>
-          </p:nvSpPr>
-          <p:spPr>
-            <a:xfrm flipH="1">
-              <a:off x="2211765" y="1819564"/>
-              <a:ext cx="2516640" cy="674709"/>
-            </a:xfrm>
-            <a:prstGeom prst="arc">
-              <a:avLst>
-                <a:gd name="adj1" fmla="val 11084431"/>
-                <a:gd name="adj2" fmla="val 0"/>
-              </a:avLst>
-            </a:prstGeom>
-            <a:noFill/>
-            <a:ln>
-              <a:solidFill>
-                <a:schemeClr val="tx1"/>
-              </a:solidFill>
-              <a:tailEnd type="arrow"/>
-            </a:ln>
-          </p:spPr>
-          <p:style>
-            <a:lnRef idx="1">
-              <a:schemeClr val="accent1"/>
-            </a:lnRef>
-            <a:fillRef idx="0">
-              <a:schemeClr val="accent1"/>
-            </a:fillRef>
-            <a:effectRef idx="0">
-              <a:schemeClr val="accent1"/>
-            </a:effectRef>
-            <a:fontRef idx="minor">
+              </a:rPr>
+              <a:t>stop</a:t>
+            </a:r>
+            <a:endParaRPr kumimoji="1" lang="ja-JP" altLang="en-US" sz="1600">
+              <a:latin typeface="Gungsuh" panose="02030600000101010101" pitchFamily="18" charset="-127"/>
+              <a:ea typeface="Gungsuh" panose="02030600000101010101" pitchFamily="18" charset="-127"/>
+            </a:endParaRPr>
+          </a:p>
+        </p:txBody>
+      </p:sp>
+      <p:cxnSp>
+        <p:nvCxnSpPr>
+          <p:cNvPr id="151" name="直線矢印コネクタ 150"/>
+          <p:cNvCxnSpPr/>
+          <p:nvPr/>
+        </p:nvCxnSpPr>
+        <p:spPr>
+          <a:xfrm>
+            <a:off x="2220065" y="2419629"/>
+            <a:ext cx="1919887" cy="0"/>
+          </a:xfrm>
+          <a:prstGeom prst="straightConnector1">
+            <a:avLst/>
+          </a:prstGeom>
+          <a:ln>
+            <a:solidFill>
               <a:schemeClr val="tx1"/>
-            </a:fontRef>
-          </p:style>
-          <p:txBody>
-            <a:bodyPr rtlCol="0" anchor="ctr"/>
-            <a:lstStyle/>
-            <a:p>
-              <a:pPr algn="ctr"/>
-              <a:endParaRPr kumimoji="1" lang="ja-JP" altLang="en-US"/>
-            </a:p>
-          </p:txBody>
-        </p:sp>
-        <p:cxnSp>
-          <p:nvCxnSpPr>
-            <p:cNvPr id="147" name="直線矢印コネクタ 146"/>
-            <p:cNvCxnSpPr/>
-            <p:nvPr/>
-          </p:nvCxnSpPr>
-          <p:spPr>
-            <a:xfrm>
-              <a:off x="971600" y="2556654"/>
-              <a:ext cx="1" cy="872346"/>
-            </a:xfrm>
-            <a:prstGeom prst="straightConnector1">
-              <a:avLst/>
-            </a:prstGeom>
-            <a:ln>
-              <a:solidFill>
-                <a:schemeClr val="tx1"/>
-              </a:solidFill>
-              <a:tailEnd type="arrow"/>
-            </a:ln>
-          </p:spPr>
-          <p:style>
-            <a:lnRef idx="1">
-              <a:schemeClr val="accent1"/>
-            </a:lnRef>
-            <a:fillRef idx="0">
-              <a:schemeClr val="accent1"/>
-            </a:fillRef>
-            <a:effectRef idx="0">
-              <a:schemeClr val="accent1"/>
-            </a:effectRef>
-            <a:fontRef idx="minor">
+            </a:solidFill>
+            <a:tailEnd type="arrow"/>
+          </a:ln>
+        </p:spPr>
+        <p:style>
+          <a:lnRef idx="1">
+            <a:schemeClr val="accent1"/>
+          </a:lnRef>
+          <a:fillRef idx="0">
+            <a:schemeClr val="accent1"/>
+          </a:fillRef>
+          <a:effectRef idx="0">
+            <a:schemeClr val="accent1"/>
+          </a:effectRef>
+          <a:fontRef idx="minor">
+            <a:schemeClr val="tx1"/>
+          </a:fontRef>
+        </p:style>
+      </p:cxnSp>
+      <p:cxnSp>
+        <p:nvCxnSpPr>
+          <p:cNvPr id="95" name="直線矢印コネクタ 94"/>
+          <p:cNvCxnSpPr/>
+          <p:nvPr/>
+        </p:nvCxnSpPr>
+        <p:spPr>
+          <a:xfrm flipV="1">
+            <a:off x="1763688" y="4450088"/>
+            <a:ext cx="0" cy="635096"/>
+          </a:xfrm>
+          <a:prstGeom prst="straightConnector1">
+            <a:avLst/>
+          </a:prstGeom>
+          <a:ln>
+            <a:solidFill>
               <a:schemeClr val="tx1"/>
-            </a:fontRef>
-          </p:style>
-        </p:cxnSp>
-        <p:sp>
-          <p:nvSpPr>
-            <p:cNvPr id="149" name="テキスト ボックス 148"/>
-            <p:cNvSpPr txBox="1"/>
-            <p:nvPr/>
-          </p:nvSpPr>
-          <p:spPr>
-            <a:xfrm>
-              <a:off x="170985" y="2678723"/>
-              <a:ext cx="872623" cy="584775"/>
-            </a:xfrm>
-            <a:prstGeom prst="rect">
-              <a:avLst/>
-            </a:prstGeom>
-            <a:noFill/>
-          </p:spPr>
-          <p:txBody>
-            <a:bodyPr wrap="square" rtlCol="0">
-              <a:spAutoFit/>
-            </a:bodyPr>
-            <a:lstStyle/>
-            <a:p>
-              <a:r>
-                <a:rPr lang="en-US" altLang="ja-JP" sz="1600" smtClean="0">
-                  <a:latin typeface="Gungsuh" panose="02030600000101010101" pitchFamily="18" charset="-127"/>
-                  <a:ea typeface="Gungsuh" panose="02030600000101010101" pitchFamily="18" charset="-127"/>
-                </a:rPr>
-                <a:t>go</a:t>
-              </a:r>
-            </a:p>
-            <a:p>
-              <a:r>
-                <a:rPr lang="en-US" altLang="ja-JP" sz="1600" smtClean="0">
-                  <a:latin typeface="Gungsuh" panose="02030600000101010101" pitchFamily="18" charset="-127"/>
-                  <a:ea typeface="Gungsuh" panose="02030600000101010101" pitchFamily="18" charset="-127"/>
-                </a:rPr>
-                <a:t>slave</a:t>
-              </a:r>
-              <a:endParaRPr kumimoji="1" lang="ja-JP" altLang="en-US" sz="1600">
+            </a:solidFill>
+            <a:tailEnd type="arrow"/>
+          </a:ln>
+        </p:spPr>
+        <p:style>
+          <a:lnRef idx="1">
+            <a:schemeClr val="accent1"/>
+          </a:lnRef>
+          <a:fillRef idx="0">
+            <a:schemeClr val="accent1"/>
+          </a:fillRef>
+          <a:effectRef idx="0">
+            <a:schemeClr val="accent1"/>
+          </a:effectRef>
+          <a:fontRef idx="minor">
+            <a:schemeClr val="tx1"/>
+          </a:fontRef>
+        </p:style>
+      </p:cxnSp>
+      <p:cxnSp>
+        <p:nvCxnSpPr>
+          <p:cNvPr id="103" name="直線矢印コネクタ 102"/>
+          <p:cNvCxnSpPr/>
+          <p:nvPr/>
+        </p:nvCxnSpPr>
+        <p:spPr>
+          <a:xfrm flipH="1">
+            <a:off x="2195738" y="2607413"/>
+            <a:ext cx="1944214" cy="0"/>
+          </a:xfrm>
+          <a:prstGeom prst="straightConnector1">
+            <a:avLst/>
+          </a:prstGeom>
+          <a:ln>
+            <a:solidFill>
+              <a:schemeClr val="tx1"/>
+            </a:solidFill>
+            <a:tailEnd type="arrow"/>
+          </a:ln>
+        </p:spPr>
+        <p:style>
+          <a:lnRef idx="1">
+            <a:schemeClr val="accent1"/>
+          </a:lnRef>
+          <a:fillRef idx="0">
+            <a:schemeClr val="accent1"/>
+          </a:fillRef>
+          <a:effectRef idx="0">
+            <a:schemeClr val="accent1"/>
+          </a:effectRef>
+          <a:fontRef idx="minor">
+            <a:schemeClr val="tx1"/>
+          </a:fontRef>
+        </p:style>
+      </p:cxnSp>
+      <p:sp>
+        <p:nvSpPr>
+          <p:cNvPr id="111" name="テキスト ボックス 110"/>
+          <p:cNvSpPr txBox="1"/>
+          <p:nvPr/>
+        </p:nvSpPr>
+        <p:spPr>
+          <a:xfrm>
+            <a:off x="2411760" y="2514382"/>
+            <a:ext cx="1972088" cy="338554"/>
+          </a:xfrm>
+          <a:prstGeom prst="rect">
+            <a:avLst/>
+          </a:prstGeom>
+          <a:noFill/>
+        </p:spPr>
+        <p:txBody>
+          <a:bodyPr wrap="square" rtlCol="0">
+            <a:spAutoFit/>
+          </a:bodyPr>
+          <a:lstStyle/>
+          <a:p>
+            <a:r>
+              <a:rPr lang="en-US" altLang="ja-JP" sz="1600" smtClean="0">
                 <a:latin typeface="Gungsuh" panose="02030600000101010101" pitchFamily="18" charset="-127"/>
                 <a:ea typeface="Gungsuh" panose="02030600000101010101" pitchFamily="18" charset="-127"/>
-              </a:endParaRPr>
-            </a:p>
-          </p:txBody>
-        </p:sp>
-        <p:sp>
-          <p:nvSpPr>
-            <p:cNvPr id="150" name="テキスト ボックス 149"/>
-            <p:cNvSpPr txBox="1"/>
-            <p:nvPr/>
-          </p:nvSpPr>
-          <p:spPr>
-            <a:xfrm>
-              <a:off x="1210439" y="2805889"/>
-              <a:ext cx="872623" cy="338554"/>
-            </a:xfrm>
-            <a:prstGeom prst="rect">
-              <a:avLst/>
-            </a:prstGeom>
-            <a:noFill/>
-          </p:spPr>
-          <p:txBody>
-            <a:bodyPr wrap="square" rtlCol="0">
-              <a:spAutoFit/>
-            </a:bodyPr>
-            <a:lstStyle/>
-            <a:p>
-              <a:r>
-                <a:rPr lang="en-US" altLang="ja-JP" sz="1600" smtClean="0">
-                  <a:latin typeface="Gungsuh" panose="02030600000101010101" pitchFamily="18" charset="-127"/>
-                  <a:ea typeface="Gungsuh" panose="02030600000101010101" pitchFamily="18" charset="-127"/>
-                </a:rPr>
-                <a:t>stop</a:t>
-              </a:r>
-              <a:endParaRPr kumimoji="1" lang="ja-JP" altLang="en-US" sz="1600">
-                <a:latin typeface="Gungsuh" panose="02030600000101010101" pitchFamily="18" charset="-127"/>
-                <a:ea typeface="Gungsuh" panose="02030600000101010101" pitchFamily="18" charset="-127"/>
-              </a:endParaRPr>
-            </a:p>
-          </p:txBody>
-        </p:sp>
-        <p:cxnSp>
-          <p:nvCxnSpPr>
-            <p:cNvPr id="151" name="直線矢印コネクタ 150"/>
-            <p:cNvCxnSpPr/>
-            <p:nvPr/>
-          </p:nvCxnSpPr>
-          <p:spPr>
-            <a:xfrm flipV="1">
-              <a:off x="1205094" y="2556654"/>
-              <a:ext cx="0" cy="837024"/>
-            </a:xfrm>
-            <a:prstGeom prst="straightConnector1">
-              <a:avLst/>
-            </a:prstGeom>
-            <a:ln>
-              <a:solidFill>
-                <a:schemeClr val="tx1"/>
-              </a:solidFill>
-              <a:tailEnd type="arrow"/>
-            </a:ln>
-          </p:spPr>
-          <p:style>
-            <a:lnRef idx="1">
-              <a:schemeClr val="accent1"/>
-            </a:lnRef>
-            <a:fillRef idx="0">
-              <a:schemeClr val="accent1"/>
-            </a:fillRef>
-            <a:effectRef idx="0">
-              <a:schemeClr val="accent1"/>
-            </a:effectRef>
-            <a:fontRef idx="minor">
-              <a:schemeClr val="tx1"/>
-            </a:fontRef>
-          </p:style>
-        </p:cxnSp>
-      </p:grpSp>
+              </a:rPr>
+              <a:t>go_syncready</a:t>
+            </a:r>
+            <a:endParaRPr kumimoji="1" lang="ja-JP" altLang="en-US" sz="1600">
+              <a:latin typeface="Gungsuh" panose="02030600000101010101" pitchFamily="18" charset="-127"/>
+              <a:ea typeface="Gungsuh" panose="02030600000101010101" pitchFamily="18" charset="-127"/>
+            </a:endParaRPr>
+          </a:p>
+        </p:txBody>
+      </p:sp>
     </p:spTree>
     <p:extLst>
       <p:ext uri="{BB962C8B-B14F-4D97-AF65-F5344CB8AC3E}">

</xml_diff>